<commit_message>
Updated presentation (this is the one that was presented). Notes based on comments and questions from the discussion.
</commit_message>
<xml_diff>
--- a/Commonality-Analysis/Lighting for Computer Graphics.pptx
+++ b/Commonality-Analysis/Lighting for Computer Graphics.pptx
@@ -3325,7 +3325,7 @@
   <dgm:whole/>
   <dgm:extLst>
     <a:ext uri="http://schemas.microsoft.com/office/drawing/2008/diagram">
-      <dsp:dataModelExt xmlns:dsp="http://schemas.microsoft.com/office/drawing/2008/diagram" relId="rId6" minVer="http://schemas.openxmlformats.org/drawingml/2006/diagram"/>
+      <dsp:dataModelExt xmlns:dsp="http://schemas.microsoft.com/office/drawing/2008/diagram" relId="rId7" minVer="http://schemas.openxmlformats.org/drawingml/2006/diagram"/>
     </a:ext>
   </dgm:extLst>
 </dgm:dataModel>
@@ -3462,7 +3462,7 @@
         <a:p>
           <a:r>
             <a:rPr lang="en-CA" dirty="0"/>
-            <a:t>GS4: Calculate the shading for different parts of the object based on light source(s) and observer positions.</a:t>
+            <a:t>GS5: Calculate the shading for different parts of the object based on light source(s) and observer positions.</a:t>
           </a:r>
         </a:p>
       </dgm:t>
@@ -3489,6 +3489,42 @@
         </a:p>
       </dgm:t>
     </dgm:pt>
+    <dgm:pt modelId="{0E5746FE-4ECF-46A4-85F4-4AB0AB188A73}">
+      <dgm:prSet/>
+      <dgm:spPr/>
+      <dgm:t>
+        <a:bodyPr/>
+        <a:lstStyle/>
+        <a:p>
+          <a:r>
+            <a:rPr lang="en-CA" dirty="0"/>
+            <a:t>GS4: Compute the normal vectors for object(s) surfaces.</a:t>
+          </a:r>
+        </a:p>
+      </dgm:t>
+    </dgm:pt>
+    <dgm:pt modelId="{DEB0D47A-6C62-4453-B83F-D37589EC0F00}" type="parTrans" cxnId="{80A1CB62-71B2-4DB4-8A5B-423DAB2AD231}">
+      <dgm:prSet/>
+      <dgm:spPr/>
+      <dgm:t>
+        <a:bodyPr/>
+        <a:lstStyle/>
+        <a:p>
+          <a:endParaRPr lang="en-CA"/>
+        </a:p>
+      </dgm:t>
+    </dgm:pt>
+    <dgm:pt modelId="{B1003CEF-A475-499C-BB79-8EABC8173CD8}" type="sibTrans" cxnId="{80A1CB62-71B2-4DB4-8A5B-423DAB2AD231}">
+      <dgm:prSet/>
+      <dgm:spPr/>
+      <dgm:t>
+        <a:bodyPr/>
+        <a:lstStyle/>
+        <a:p>
+          <a:endParaRPr lang="en-CA"/>
+        </a:p>
+      </dgm:t>
+    </dgm:pt>
     <dgm:pt modelId="{18000C62-2E46-4071-AD79-58C2CE4DEE9E}" type="pres">
       <dgm:prSet presAssocID="{8889845A-1100-42F9-B2F2-251935377383}" presName="outerComposite" presStyleCnt="0">
         <dgm:presLayoutVars>
@@ -3505,88 +3541,112 @@
       </dgm:prSet>
       <dgm:spPr/>
     </dgm:pt>
-    <dgm:pt modelId="{A3174BB8-A10B-42C7-8774-E61262FFFE6E}" type="pres">
-      <dgm:prSet presAssocID="{8889845A-1100-42F9-B2F2-251935377383}" presName="FourNodes_1" presStyleLbl="node1" presStyleIdx="0" presStyleCnt="4">
+    <dgm:pt modelId="{28DA7752-2327-4121-AAD4-BFF94384184E}" type="pres">
+      <dgm:prSet presAssocID="{8889845A-1100-42F9-B2F2-251935377383}" presName="FiveNodes_1" presStyleLbl="node1" presStyleIdx="0" presStyleCnt="5">
         <dgm:presLayoutVars>
           <dgm:bulletEnabled val="1"/>
         </dgm:presLayoutVars>
       </dgm:prSet>
       <dgm:spPr/>
     </dgm:pt>
-    <dgm:pt modelId="{BC76D8B1-DBC6-4283-AC26-C041CB50972B}" type="pres">
-      <dgm:prSet presAssocID="{8889845A-1100-42F9-B2F2-251935377383}" presName="FourNodes_2" presStyleLbl="node1" presStyleIdx="1" presStyleCnt="4">
+    <dgm:pt modelId="{4540C780-277C-4986-814B-E4C03148B9B4}" type="pres">
+      <dgm:prSet presAssocID="{8889845A-1100-42F9-B2F2-251935377383}" presName="FiveNodes_2" presStyleLbl="node1" presStyleIdx="1" presStyleCnt="5">
         <dgm:presLayoutVars>
           <dgm:bulletEnabled val="1"/>
         </dgm:presLayoutVars>
       </dgm:prSet>
       <dgm:spPr/>
     </dgm:pt>
-    <dgm:pt modelId="{E5B25AD9-1221-436F-9BEE-1559CC6A21C6}" type="pres">
-      <dgm:prSet presAssocID="{8889845A-1100-42F9-B2F2-251935377383}" presName="FourNodes_3" presStyleLbl="node1" presStyleIdx="2" presStyleCnt="4">
+    <dgm:pt modelId="{9677FC07-C525-49B2-9317-7A5298FC0341}" type="pres">
+      <dgm:prSet presAssocID="{8889845A-1100-42F9-B2F2-251935377383}" presName="FiveNodes_3" presStyleLbl="node1" presStyleIdx="2" presStyleCnt="5">
         <dgm:presLayoutVars>
           <dgm:bulletEnabled val="1"/>
         </dgm:presLayoutVars>
       </dgm:prSet>
       <dgm:spPr/>
     </dgm:pt>
-    <dgm:pt modelId="{48868070-824A-4F3E-A571-194B676D2C34}" type="pres">
-      <dgm:prSet presAssocID="{8889845A-1100-42F9-B2F2-251935377383}" presName="FourNodes_4" presStyleLbl="node1" presStyleIdx="3" presStyleCnt="4" custLinFactNeighborX="-8627" custLinFactNeighborY="0">
+    <dgm:pt modelId="{29B2C4B4-3757-4CC1-BBF8-78A9E22EFF8C}" type="pres">
+      <dgm:prSet presAssocID="{8889845A-1100-42F9-B2F2-251935377383}" presName="FiveNodes_4" presStyleLbl="node1" presStyleIdx="3" presStyleCnt="5">
         <dgm:presLayoutVars>
           <dgm:bulletEnabled val="1"/>
         </dgm:presLayoutVars>
       </dgm:prSet>
       <dgm:spPr/>
     </dgm:pt>
-    <dgm:pt modelId="{F6D6C56F-1B1F-4BD1-835F-52944CD2C2B3}" type="pres">
-      <dgm:prSet presAssocID="{8889845A-1100-42F9-B2F2-251935377383}" presName="FourConn_1-2" presStyleLbl="fgAccFollowNode1" presStyleIdx="0" presStyleCnt="3">
+    <dgm:pt modelId="{8D780956-8F4C-4D0E-A227-5F2C35659D0B}" type="pres">
+      <dgm:prSet presAssocID="{8889845A-1100-42F9-B2F2-251935377383}" presName="FiveNodes_5" presStyleLbl="node1" presStyleIdx="4" presStyleCnt="5" custLinFactNeighborX="-14277" custLinFactNeighborY="0">
         <dgm:presLayoutVars>
           <dgm:bulletEnabled val="1"/>
         </dgm:presLayoutVars>
       </dgm:prSet>
       <dgm:spPr/>
     </dgm:pt>
-    <dgm:pt modelId="{967517DF-0464-4654-B6B8-5A1CB5316091}" type="pres">
-      <dgm:prSet presAssocID="{8889845A-1100-42F9-B2F2-251935377383}" presName="FourConn_2-3" presStyleLbl="fgAccFollowNode1" presStyleIdx="1" presStyleCnt="3" custLinFactNeighborX="-87709">
+    <dgm:pt modelId="{6B794CBE-C3B0-4A5C-9EE7-30EC45857E19}" type="pres">
+      <dgm:prSet presAssocID="{8889845A-1100-42F9-B2F2-251935377383}" presName="FiveConn_1-2" presStyleLbl="fgAccFollowNode1" presStyleIdx="0" presStyleCnt="4">
         <dgm:presLayoutVars>
           <dgm:bulletEnabled val="1"/>
         </dgm:presLayoutVars>
       </dgm:prSet>
       <dgm:spPr/>
     </dgm:pt>
-    <dgm:pt modelId="{C7AAC6DE-9135-4500-BAE0-19DF8E468AB1}" type="pres">
-      <dgm:prSet presAssocID="{8889845A-1100-42F9-B2F2-251935377383}" presName="FourConn_3-4" presStyleLbl="fgAccFollowNode1" presStyleIdx="2" presStyleCnt="3" custScaleY="307587" custLinFactX="-15995" custLinFactNeighborX="-100000" custLinFactNeighborY="-78236">
+    <dgm:pt modelId="{79263527-2752-4B46-87E5-B8B0AA88DA40}" type="pres">
+      <dgm:prSet presAssocID="{8889845A-1100-42F9-B2F2-251935377383}" presName="FiveConn_2-3" presStyleLbl="fgAccFollowNode1" presStyleIdx="1" presStyleCnt="4" custLinFactNeighborX="-75273">
         <dgm:presLayoutVars>
           <dgm:bulletEnabled val="1"/>
         </dgm:presLayoutVars>
       </dgm:prSet>
       <dgm:spPr/>
     </dgm:pt>
-    <dgm:pt modelId="{8A118A7B-C0E8-4456-8CBB-C28757A995E4}" type="pres">
-      <dgm:prSet presAssocID="{8889845A-1100-42F9-B2F2-251935377383}" presName="FourNodes_1_text" presStyleLbl="node1" presStyleIdx="3" presStyleCnt="4">
+    <dgm:pt modelId="{36C938D6-4546-4054-8CD2-E5658A3F3F16}" type="pres">
+      <dgm:prSet presAssocID="{8889845A-1100-42F9-B2F2-251935377383}" presName="FiveConn_3-4" presStyleLbl="fgAccFollowNode1" presStyleIdx="2" presStyleCnt="4" custLinFactX="-89833" custLinFactNeighborX="-100000">
         <dgm:presLayoutVars>
           <dgm:bulletEnabled val="1"/>
         </dgm:presLayoutVars>
       </dgm:prSet>
       <dgm:spPr/>
     </dgm:pt>
-    <dgm:pt modelId="{C2276CE5-E302-4653-9D28-5B28437C86C8}" type="pres">
-      <dgm:prSet presAssocID="{8889845A-1100-42F9-B2F2-251935377383}" presName="FourNodes_2_text" presStyleLbl="node1" presStyleIdx="3" presStyleCnt="4">
+    <dgm:pt modelId="{20030918-E32E-47C8-B215-FE7320BA7D37}" type="pres">
+      <dgm:prSet presAssocID="{8889845A-1100-42F9-B2F2-251935377383}" presName="FiveConn_4-5" presStyleLbl="fgAccFollowNode1" presStyleIdx="3" presStyleCnt="4" custScaleY="483879" custLinFactX="-100000" custLinFactY="-54592" custLinFactNeighborX="-122534" custLinFactNeighborY="-100000">
         <dgm:presLayoutVars>
           <dgm:bulletEnabled val="1"/>
         </dgm:presLayoutVars>
       </dgm:prSet>
       <dgm:spPr/>
     </dgm:pt>
-    <dgm:pt modelId="{03888D64-9B27-4A90-A9D3-F4F75ABE0C23}" type="pres">
-      <dgm:prSet presAssocID="{8889845A-1100-42F9-B2F2-251935377383}" presName="FourNodes_3_text" presStyleLbl="node1" presStyleIdx="3" presStyleCnt="4">
+    <dgm:pt modelId="{5E450A39-D3A9-417E-8E98-D4C9B115F961}" type="pres">
+      <dgm:prSet presAssocID="{8889845A-1100-42F9-B2F2-251935377383}" presName="FiveNodes_1_text" presStyleLbl="node1" presStyleIdx="4" presStyleCnt="5">
         <dgm:presLayoutVars>
           <dgm:bulletEnabled val="1"/>
         </dgm:presLayoutVars>
       </dgm:prSet>
       <dgm:spPr/>
     </dgm:pt>
-    <dgm:pt modelId="{715DD2DA-B4B7-46D8-B8E1-91C032EAB61D}" type="pres">
-      <dgm:prSet presAssocID="{8889845A-1100-42F9-B2F2-251935377383}" presName="FourNodes_4_text" presStyleLbl="node1" presStyleIdx="3" presStyleCnt="4">
+    <dgm:pt modelId="{797D0E99-C39D-4A08-9246-8B1080C40693}" type="pres">
+      <dgm:prSet presAssocID="{8889845A-1100-42F9-B2F2-251935377383}" presName="FiveNodes_2_text" presStyleLbl="node1" presStyleIdx="4" presStyleCnt="5">
+        <dgm:presLayoutVars>
+          <dgm:bulletEnabled val="1"/>
+        </dgm:presLayoutVars>
+      </dgm:prSet>
+      <dgm:spPr/>
+    </dgm:pt>
+    <dgm:pt modelId="{8DC4358A-AC9D-4C64-9EDB-E77D0261DEFF}" type="pres">
+      <dgm:prSet presAssocID="{8889845A-1100-42F9-B2F2-251935377383}" presName="FiveNodes_3_text" presStyleLbl="node1" presStyleIdx="4" presStyleCnt="5">
+        <dgm:presLayoutVars>
+          <dgm:bulletEnabled val="1"/>
+        </dgm:presLayoutVars>
+      </dgm:prSet>
+      <dgm:spPr/>
+    </dgm:pt>
+    <dgm:pt modelId="{B9F7CA76-53CB-4DA0-8F9B-C91E163A1606}" type="pres">
+      <dgm:prSet presAssocID="{8889845A-1100-42F9-B2F2-251935377383}" presName="FiveNodes_4_text" presStyleLbl="node1" presStyleIdx="4" presStyleCnt="5">
+        <dgm:presLayoutVars>
+          <dgm:bulletEnabled val="1"/>
+        </dgm:presLayoutVars>
+      </dgm:prSet>
+      <dgm:spPr/>
+    </dgm:pt>
+    <dgm:pt modelId="{D39E25A6-BF24-4E65-AF02-EB77E208F3AC}" type="pres">
+      <dgm:prSet presAssocID="{8889845A-1100-42F9-B2F2-251935377383}" presName="FiveNodes_5_text" presStyleLbl="node1" presStyleIdx="4" presStyleCnt="5">
         <dgm:presLayoutVars>
           <dgm:bulletEnabled val="1"/>
         </dgm:presLayoutVars>
@@ -3595,34 +3655,41 @@
     </dgm:pt>
   </dgm:ptLst>
   <dgm:cxnLst>
-    <dgm:cxn modelId="{103DDF09-2A1B-42ED-A523-16DD241E17BD}" type="presOf" srcId="{D4D0DD78-BF54-495E-86A3-DC42D57AB027}" destId="{BC76D8B1-DBC6-4283-AC26-C041CB50972B}" srcOrd="0" destOrd="0" presId="urn:microsoft.com/office/officeart/2005/8/layout/vProcess5"/>
-    <dgm:cxn modelId="{F9A90A39-0ADF-4364-BDAB-8CCDDADD4A13}" type="presOf" srcId="{6E354274-A84A-48CE-8AD2-AFC294E740F7}" destId="{C7AAC6DE-9135-4500-BAE0-19DF8E468AB1}" srcOrd="0" destOrd="0" presId="urn:microsoft.com/office/officeart/2005/8/layout/vProcess5"/>
+    <dgm:cxn modelId="{247CCA05-69F0-490B-816C-0A1BC2AC0E6C}" type="presOf" srcId="{7B7D6211-8656-477C-ACD6-CAB07DD79B6E}" destId="{8D780956-8F4C-4D0E-A227-5F2C35659D0B}" srcOrd="0" destOrd="0" presId="urn:microsoft.com/office/officeart/2005/8/layout/vProcess5"/>
+    <dgm:cxn modelId="{A39DB80E-7791-4FA4-9A4C-90B2AD9BD86C}" type="presOf" srcId="{6E354274-A84A-48CE-8AD2-AFC294E740F7}" destId="{36C938D6-4546-4054-8CD2-E5658A3F3F16}" srcOrd="0" destOrd="0" presId="urn:microsoft.com/office/officeart/2005/8/layout/vProcess5"/>
+    <dgm:cxn modelId="{585EEF0F-B952-426C-808B-2FB1BB9844CA}" type="presOf" srcId="{B1003CEF-A475-499C-BB79-8EABC8173CD8}" destId="{20030918-E32E-47C8-B215-FE7320BA7D37}" srcOrd="0" destOrd="0" presId="urn:microsoft.com/office/officeart/2005/8/layout/vProcess5"/>
+    <dgm:cxn modelId="{2D2B3317-C940-44A3-970E-CE4BD700B6F8}" type="presOf" srcId="{7B7D6211-8656-477C-ACD6-CAB07DD79B6E}" destId="{D39E25A6-BF24-4E65-AF02-EB77E208F3AC}" srcOrd="1" destOrd="0" presId="urn:microsoft.com/office/officeart/2005/8/layout/vProcess5"/>
+    <dgm:cxn modelId="{33297A1A-D606-4C3B-A47F-43268D9EBE0C}" type="presOf" srcId="{9BECE8C8-75F4-469E-BAF7-227511302B59}" destId="{8DC4358A-AC9D-4C64-9EDB-E77D0261DEFF}" srcOrd="1" destOrd="0" presId="urn:microsoft.com/office/officeart/2005/8/layout/vProcess5"/>
+    <dgm:cxn modelId="{D0A8EA1B-3E18-4CFC-9A23-2153850258EE}" type="presOf" srcId="{D4D0DD78-BF54-495E-86A3-DC42D57AB027}" destId="{797D0E99-C39D-4A08-9246-8B1080C40693}" srcOrd="1" destOrd="0" presId="urn:microsoft.com/office/officeart/2005/8/layout/vProcess5"/>
+    <dgm:cxn modelId="{1C94B41D-5779-4E75-A2E7-0AA65D01B0D5}" type="presOf" srcId="{0E5746FE-4ECF-46A4-85F4-4AB0AB188A73}" destId="{B9F7CA76-53CB-4DA0-8F9B-C91E163A1606}" srcOrd="1" destOrd="0" presId="urn:microsoft.com/office/officeart/2005/8/layout/vProcess5"/>
     <dgm:cxn modelId="{D912243F-3AC6-4810-8B1E-33361E9CAA59}" srcId="{8889845A-1100-42F9-B2F2-251935377383}" destId="{9BECE8C8-75F4-469E-BAF7-227511302B59}" srcOrd="2" destOrd="0" parTransId="{C546AFDF-2430-4DA1-9150-1BD5B939B4B5}" sibTransId="{6E354274-A84A-48CE-8AD2-AFC294E740F7}"/>
+    <dgm:cxn modelId="{80A1CB62-71B2-4DB4-8A5B-423DAB2AD231}" srcId="{8889845A-1100-42F9-B2F2-251935377383}" destId="{0E5746FE-4ECF-46A4-85F4-4AB0AB188A73}" srcOrd="3" destOrd="0" parTransId="{DEB0D47A-6C62-4453-B83F-D37589EC0F00}" sibTransId="{B1003CEF-A475-499C-BB79-8EABC8173CD8}"/>
+    <dgm:cxn modelId="{F4C0F365-A628-4EC6-9B46-01F21A27333D}" type="presOf" srcId="{0E5746FE-4ECF-46A4-85F4-4AB0AB188A73}" destId="{29B2C4B4-3757-4CC1-BBF8-78A9E22EFF8C}" srcOrd="0" destOrd="0" presId="urn:microsoft.com/office/officeart/2005/8/layout/vProcess5"/>
     <dgm:cxn modelId="{65C10B68-3E6B-4276-92C3-2F8CB8E9BA46}" srcId="{8889845A-1100-42F9-B2F2-251935377383}" destId="{9920DAA9-15C4-4EFB-9AF2-D04786549126}" srcOrd="0" destOrd="0" parTransId="{196BE60C-75D7-41C4-AAAE-030C2AFA334F}" sibTransId="{AF913648-1097-4560-A62D-D2F2D2AD2C71}"/>
     <dgm:cxn modelId="{47F5974E-418A-40B0-8B96-1BBAB5EF74E4}" srcId="{8889845A-1100-42F9-B2F2-251935377383}" destId="{D4D0DD78-BF54-495E-86A3-DC42D57AB027}" srcOrd="1" destOrd="0" parTransId="{C8E6650C-5BFF-477F-A838-81208C9D8104}" sibTransId="{F1990154-C811-4C30-86E7-354D7031052E}"/>
-    <dgm:cxn modelId="{84E2FD58-B1B5-4245-8FEF-9159D39D955F}" type="presOf" srcId="{9BECE8C8-75F4-469E-BAF7-227511302B59}" destId="{E5B25AD9-1221-436F-9BEE-1559CC6A21C6}" srcOrd="0" destOrd="0" presId="urn:microsoft.com/office/officeart/2005/8/layout/vProcess5"/>
-    <dgm:cxn modelId="{F46F0480-0B8E-4669-97AA-542218FD3AB6}" type="presOf" srcId="{7B7D6211-8656-477C-ACD6-CAB07DD79B6E}" destId="{715DD2DA-B4B7-46D8-B8E1-91C032EAB61D}" srcOrd="1" destOrd="0" presId="urn:microsoft.com/office/officeart/2005/8/layout/vProcess5"/>
-    <dgm:cxn modelId="{89E2A099-43EB-4DA5-A2EB-B575FEE367C2}" type="presOf" srcId="{F1990154-C811-4C30-86E7-354D7031052E}" destId="{967517DF-0464-4654-B6B8-5A1CB5316091}" srcOrd="0" destOrd="0" presId="urn:microsoft.com/office/officeart/2005/8/layout/vProcess5"/>
-    <dgm:cxn modelId="{CE58DFAA-E0D4-4A49-B322-D1916B322180}" type="presOf" srcId="{7B7D6211-8656-477C-ACD6-CAB07DD79B6E}" destId="{48868070-824A-4F3E-A571-194B676D2C34}" srcOrd="0" destOrd="0" presId="urn:microsoft.com/office/officeart/2005/8/layout/vProcess5"/>
     <dgm:cxn modelId="{A947E1AF-005B-4813-AA2C-8DC822C4E19D}" type="presOf" srcId="{8889845A-1100-42F9-B2F2-251935377383}" destId="{18000C62-2E46-4071-AD79-58C2CE4DEE9E}" srcOrd="0" destOrd="0" presId="urn:microsoft.com/office/officeart/2005/8/layout/vProcess5"/>
-    <dgm:cxn modelId="{B792DFB2-7217-4D0D-BF2B-0B0396D13D9F}" type="presOf" srcId="{D4D0DD78-BF54-495E-86A3-DC42D57AB027}" destId="{C2276CE5-E302-4653-9D28-5B28437C86C8}" srcOrd="1" destOrd="0" presId="urn:microsoft.com/office/officeart/2005/8/layout/vProcess5"/>
-    <dgm:cxn modelId="{8FE7A5B3-9682-46BD-A50B-7C00777CA330}" type="presOf" srcId="{9920DAA9-15C4-4EFB-9AF2-D04786549126}" destId="{A3174BB8-A10B-42C7-8774-E61262FFFE6E}" srcOrd="0" destOrd="0" presId="urn:microsoft.com/office/officeart/2005/8/layout/vProcess5"/>
-    <dgm:cxn modelId="{F2F290D8-45B9-4040-84FA-5DD6476ED45B}" type="presOf" srcId="{9BECE8C8-75F4-469E-BAF7-227511302B59}" destId="{03888D64-9B27-4A90-A9D3-F4F75ABE0C23}" srcOrd="1" destOrd="0" presId="urn:microsoft.com/office/officeart/2005/8/layout/vProcess5"/>
-    <dgm:cxn modelId="{68FB63E1-21CA-43F8-806D-6929A543B115}" type="presOf" srcId="{9920DAA9-15C4-4EFB-9AF2-D04786549126}" destId="{8A118A7B-C0E8-4456-8CBB-C28757A995E4}" srcOrd="1" destOrd="0" presId="urn:microsoft.com/office/officeart/2005/8/layout/vProcess5"/>
-    <dgm:cxn modelId="{FEA88DE4-B668-47CD-935C-741421E0077D}" srcId="{8889845A-1100-42F9-B2F2-251935377383}" destId="{7B7D6211-8656-477C-ACD6-CAB07DD79B6E}" srcOrd="3" destOrd="0" parTransId="{B0B691CF-034F-4BF8-936A-F46A27B49B2A}" sibTransId="{059F0308-93DC-4768-93C8-2F76CC55F8E8}"/>
-    <dgm:cxn modelId="{3B6A3FFF-93EB-4F7B-9909-EBD9BDB805C7}" type="presOf" srcId="{AF913648-1097-4560-A62D-D2F2D2AD2C71}" destId="{F6D6C56F-1B1F-4BD1-835F-52944CD2C2B3}" srcOrd="0" destOrd="0" presId="urn:microsoft.com/office/officeart/2005/8/layout/vProcess5"/>
+    <dgm:cxn modelId="{A5D904B5-30DA-4838-8571-31D10D0CFB3A}" type="presOf" srcId="{F1990154-C811-4C30-86E7-354D7031052E}" destId="{79263527-2752-4B46-87E5-B8B0AA88DA40}" srcOrd="0" destOrd="0" presId="urn:microsoft.com/office/officeart/2005/8/layout/vProcess5"/>
+    <dgm:cxn modelId="{9FE73CB9-0B22-473A-844A-6E71B949E0C9}" type="presOf" srcId="{D4D0DD78-BF54-495E-86A3-DC42D57AB027}" destId="{4540C780-277C-4986-814B-E4C03148B9B4}" srcOrd="0" destOrd="0" presId="urn:microsoft.com/office/officeart/2005/8/layout/vProcess5"/>
+    <dgm:cxn modelId="{CA0067C3-C9AF-4CB9-AEAA-6F175B3F9281}" type="presOf" srcId="{9920DAA9-15C4-4EFB-9AF2-D04786549126}" destId="{28DA7752-2327-4121-AAD4-BFF94384184E}" srcOrd="0" destOrd="0" presId="urn:microsoft.com/office/officeart/2005/8/layout/vProcess5"/>
+    <dgm:cxn modelId="{286262D5-7EE7-416D-B446-3F6C32BB756E}" type="presOf" srcId="{9920DAA9-15C4-4EFB-9AF2-D04786549126}" destId="{5E450A39-D3A9-417E-8E98-D4C9B115F961}" srcOrd="1" destOrd="0" presId="urn:microsoft.com/office/officeart/2005/8/layout/vProcess5"/>
+    <dgm:cxn modelId="{A98A55DC-6029-4943-A4BA-9E002DB496EC}" type="presOf" srcId="{AF913648-1097-4560-A62D-D2F2D2AD2C71}" destId="{6B794CBE-C3B0-4A5C-9EE7-30EC45857E19}" srcOrd="0" destOrd="0" presId="urn:microsoft.com/office/officeart/2005/8/layout/vProcess5"/>
+    <dgm:cxn modelId="{D04E16E1-6DC6-423D-9CB9-F682F30AF1E6}" type="presOf" srcId="{9BECE8C8-75F4-469E-BAF7-227511302B59}" destId="{9677FC07-C525-49B2-9317-7A5298FC0341}" srcOrd="0" destOrd="0" presId="urn:microsoft.com/office/officeart/2005/8/layout/vProcess5"/>
+    <dgm:cxn modelId="{FEA88DE4-B668-47CD-935C-741421E0077D}" srcId="{8889845A-1100-42F9-B2F2-251935377383}" destId="{7B7D6211-8656-477C-ACD6-CAB07DD79B6E}" srcOrd="4" destOrd="0" parTransId="{B0B691CF-034F-4BF8-936A-F46A27B49B2A}" sibTransId="{059F0308-93DC-4768-93C8-2F76CC55F8E8}"/>
     <dgm:cxn modelId="{E62F4CBD-445A-4E61-92EB-82673A500B61}" type="presParOf" srcId="{18000C62-2E46-4071-AD79-58C2CE4DEE9E}" destId="{207F254C-B97A-42CF-BBC9-E920A256409F}" srcOrd="0" destOrd="0" presId="urn:microsoft.com/office/officeart/2005/8/layout/vProcess5"/>
-    <dgm:cxn modelId="{5B74022D-43FF-487A-A647-336B77223352}" type="presParOf" srcId="{18000C62-2E46-4071-AD79-58C2CE4DEE9E}" destId="{A3174BB8-A10B-42C7-8774-E61262FFFE6E}" srcOrd="1" destOrd="0" presId="urn:microsoft.com/office/officeart/2005/8/layout/vProcess5"/>
-    <dgm:cxn modelId="{20EB27CB-0326-46BA-80F1-1F3AE5301C53}" type="presParOf" srcId="{18000C62-2E46-4071-AD79-58C2CE4DEE9E}" destId="{BC76D8B1-DBC6-4283-AC26-C041CB50972B}" srcOrd="2" destOrd="0" presId="urn:microsoft.com/office/officeart/2005/8/layout/vProcess5"/>
-    <dgm:cxn modelId="{B96BE9DA-CF92-4AC2-940B-A626CBA67915}" type="presParOf" srcId="{18000C62-2E46-4071-AD79-58C2CE4DEE9E}" destId="{E5B25AD9-1221-436F-9BEE-1559CC6A21C6}" srcOrd="3" destOrd="0" presId="urn:microsoft.com/office/officeart/2005/8/layout/vProcess5"/>
-    <dgm:cxn modelId="{3707D454-619E-4EE5-B80B-27885087C6B6}" type="presParOf" srcId="{18000C62-2E46-4071-AD79-58C2CE4DEE9E}" destId="{48868070-824A-4F3E-A571-194B676D2C34}" srcOrd="4" destOrd="0" presId="urn:microsoft.com/office/officeart/2005/8/layout/vProcess5"/>
-    <dgm:cxn modelId="{CC7EB6D7-8A58-44E6-A1EB-4A428BFA98F8}" type="presParOf" srcId="{18000C62-2E46-4071-AD79-58C2CE4DEE9E}" destId="{F6D6C56F-1B1F-4BD1-835F-52944CD2C2B3}" srcOrd="5" destOrd="0" presId="urn:microsoft.com/office/officeart/2005/8/layout/vProcess5"/>
-    <dgm:cxn modelId="{4BC9F35F-5A57-4389-8DD2-E1FB34B88F66}" type="presParOf" srcId="{18000C62-2E46-4071-AD79-58C2CE4DEE9E}" destId="{967517DF-0464-4654-B6B8-5A1CB5316091}" srcOrd="6" destOrd="0" presId="urn:microsoft.com/office/officeart/2005/8/layout/vProcess5"/>
-    <dgm:cxn modelId="{868DBE16-1A09-41B1-8D1A-030F26B83A52}" type="presParOf" srcId="{18000C62-2E46-4071-AD79-58C2CE4DEE9E}" destId="{C7AAC6DE-9135-4500-BAE0-19DF8E468AB1}" srcOrd="7" destOrd="0" presId="urn:microsoft.com/office/officeart/2005/8/layout/vProcess5"/>
-    <dgm:cxn modelId="{F6EE8809-0836-4C6D-9DC9-97BA6370680E}" type="presParOf" srcId="{18000C62-2E46-4071-AD79-58C2CE4DEE9E}" destId="{8A118A7B-C0E8-4456-8CBB-C28757A995E4}" srcOrd="8" destOrd="0" presId="urn:microsoft.com/office/officeart/2005/8/layout/vProcess5"/>
-    <dgm:cxn modelId="{C9870B47-CA1A-453B-9FF3-F57ACF4BAE33}" type="presParOf" srcId="{18000C62-2E46-4071-AD79-58C2CE4DEE9E}" destId="{C2276CE5-E302-4653-9D28-5B28437C86C8}" srcOrd="9" destOrd="0" presId="urn:microsoft.com/office/officeart/2005/8/layout/vProcess5"/>
-    <dgm:cxn modelId="{676C157C-8E5A-4763-BD7B-CE1699B26718}" type="presParOf" srcId="{18000C62-2E46-4071-AD79-58C2CE4DEE9E}" destId="{03888D64-9B27-4A90-A9D3-F4F75ABE0C23}" srcOrd="10" destOrd="0" presId="urn:microsoft.com/office/officeart/2005/8/layout/vProcess5"/>
-    <dgm:cxn modelId="{99EEDAA4-1E4C-4898-B872-CF589A65DBEF}" type="presParOf" srcId="{18000C62-2E46-4071-AD79-58C2CE4DEE9E}" destId="{715DD2DA-B4B7-46D8-B8E1-91C032EAB61D}" srcOrd="11" destOrd="0" presId="urn:microsoft.com/office/officeart/2005/8/layout/vProcess5"/>
+    <dgm:cxn modelId="{01A6497A-713F-4E07-B9BB-2F64FA871CBE}" type="presParOf" srcId="{18000C62-2E46-4071-AD79-58C2CE4DEE9E}" destId="{28DA7752-2327-4121-AAD4-BFF94384184E}" srcOrd="1" destOrd="0" presId="urn:microsoft.com/office/officeart/2005/8/layout/vProcess5"/>
+    <dgm:cxn modelId="{ED420591-4114-455C-BD98-241A5B39A868}" type="presParOf" srcId="{18000C62-2E46-4071-AD79-58C2CE4DEE9E}" destId="{4540C780-277C-4986-814B-E4C03148B9B4}" srcOrd="2" destOrd="0" presId="urn:microsoft.com/office/officeart/2005/8/layout/vProcess5"/>
+    <dgm:cxn modelId="{11613003-040A-492C-83A2-AC485D705837}" type="presParOf" srcId="{18000C62-2E46-4071-AD79-58C2CE4DEE9E}" destId="{9677FC07-C525-49B2-9317-7A5298FC0341}" srcOrd="3" destOrd="0" presId="urn:microsoft.com/office/officeart/2005/8/layout/vProcess5"/>
+    <dgm:cxn modelId="{422D4DBF-3517-4D9E-9164-E6A1C202B41F}" type="presParOf" srcId="{18000C62-2E46-4071-AD79-58C2CE4DEE9E}" destId="{29B2C4B4-3757-4CC1-BBF8-78A9E22EFF8C}" srcOrd="4" destOrd="0" presId="urn:microsoft.com/office/officeart/2005/8/layout/vProcess5"/>
+    <dgm:cxn modelId="{5265BE83-B08A-499B-AB27-2106B0A6634E}" type="presParOf" srcId="{18000C62-2E46-4071-AD79-58C2CE4DEE9E}" destId="{8D780956-8F4C-4D0E-A227-5F2C35659D0B}" srcOrd="5" destOrd="0" presId="urn:microsoft.com/office/officeart/2005/8/layout/vProcess5"/>
+    <dgm:cxn modelId="{968D5E7B-A765-43BD-86C3-A02939586E3E}" type="presParOf" srcId="{18000C62-2E46-4071-AD79-58C2CE4DEE9E}" destId="{6B794CBE-C3B0-4A5C-9EE7-30EC45857E19}" srcOrd="6" destOrd="0" presId="urn:microsoft.com/office/officeart/2005/8/layout/vProcess5"/>
+    <dgm:cxn modelId="{037F52FC-C7B2-400F-A3B1-9C43248E39DF}" type="presParOf" srcId="{18000C62-2E46-4071-AD79-58C2CE4DEE9E}" destId="{79263527-2752-4B46-87E5-B8B0AA88DA40}" srcOrd="7" destOrd="0" presId="urn:microsoft.com/office/officeart/2005/8/layout/vProcess5"/>
+    <dgm:cxn modelId="{51208B01-6399-4DFF-8121-F89BB67D0FF9}" type="presParOf" srcId="{18000C62-2E46-4071-AD79-58C2CE4DEE9E}" destId="{36C938D6-4546-4054-8CD2-E5658A3F3F16}" srcOrd="8" destOrd="0" presId="urn:microsoft.com/office/officeart/2005/8/layout/vProcess5"/>
+    <dgm:cxn modelId="{EEF7656F-3171-4DCF-8E24-C6C5DA28FE30}" type="presParOf" srcId="{18000C62-2E46-4071-AD79-58C2CE4DEE9E}" destId="{20030918-E32E-47C8-B215-FE7320BA7D37}" srcOrd="9" destOrd="0" presId="urn:microsoft.com/office/officeart/2005/8/layout/vProcess5"/>
+    <dgm:cxn modelId="{A55A7BE1-BF01-43AC-A568-B30D76E227F9}" type="presParOf" srcId="{18000C62-2E46-4071-AD79-58C2CE4DEE9E}" destId="{5E450A39-D3A9-417E-8E98-D4C9B115F961}" srcOrd="10" destOrd="0" presId="urn:microsoft.com/office/officeart/2005/8/layout/vProcess5"/>
+    <dgm:cxn modelId="{95054E9B-10B4-4207-992E-006818047EA2}" type="presParOf" srcId="{18000C62-2E46-4071-AD79-58C2CE4DEE9E}" destId="{797D0E99-C39D-4A08-9246-8B1080C40693}" srcOrd="11" destOrd="0" presId="urn:microsoft.com/office/officeart/2005/8/layout/vProcess5"/>
+    <dgm:cxn modelId="{52472528-F643-4274-966C-1DCB577388E4}" type="presParOf" srcId="{18000C62-2E46-4071-AD79-58C2CE4DEE9E}" destId="{8DC4358A-AC9D-4C64-9EDB-E77D0261DEFF}" srcOrd="12" destOrd="0" presId="urn:microsoft.com/office/officeart/2005/8/layout/vProcess5"/>
+    <dgm:cxn modelId="{49DA6B4D-B608-49A0-878C-4CE0DE3D8849}" type="presParOf" srcId="{18000C62-2E46-4071-AD79-58C2CE4DEE9E}" destId="{B9F7CA76-53CB-4DA0-8F9B-C91E163A1606}" srcOrd="13" destOrd="0" presId="urn:microsoft.com/office/officeart/2005/8/layout/vProcess5"/>
+    <dgm:cxn modelId="{9DCF016C-D186-441D-A7CA-18612B9C6691}" type="presParOf" srcId="{18000C62-2E46-4071-AD79-58C2CE4DEE9E}" destId="{D39E25A6-BF24-4E65-AF02-EB77E208F3AC}" srcOrd="14" destOrd="0" presId="urn:microsoft.com/office/officeart/2005/8/layout/vProcess5"/>
   </dgm:cxnLst>
   <dgm:bg/>
   <dgm:whole/>
@@ -4350,15 +4417,15 @@
       <dsp:cNvGrpSpPr/>
     </dsp:nvGrpSpPr>
     <dsp:grpSpPr/>
-    <dsp:sp modelId="{A3174BB8-A10B-42C7-8774-E61262FFFE6E}">
+    <dsp:sp modelId="{28DA7752-2327-4121-AAD4-BFF94384184E}">
       <dsp:nvSpPr>
         <dsp:cNvPr id="0" name=""/>
         <dsp:cNvSpPr/>
       </dsp:nvSpPr>
       <dsp:spPr>
         <a:xfrm>
-          <a:off x="0" y="0"/>
-          <a:ext cx="8199118" cy="938193"/>
+          <a:off x="0" y="-185654"/>
+          <a:ext cx="7891651" cy="767613"/>
         </a:xfrm>
         <a:prstGeom prst="roundRect">
           <a:avLst>
@@ -4426,19 +4493,19 @@
         </a:p>
       </dsp:txBody>
       <dsp:txXfrm>
-        <a:off x="27479" y="27479"/>
-        <a:ext cx="7107456" cy="883235"/>
+        <a:off x="22483" y="-163171"/>
+        <a:ext cx="6973525" cy="722647"/>
       </dsp:txXfrm>
     </dsp:sp>
-    <dsp:sp modelId="{BC76D8B1-DBC6-4283-AC26-C041CB50972B}">
+    <dsp:sp modelId="{4540C780-277C-4986-814B-E4C03148B9B4}">
       <dsp:nvSpPr>
         <dsp:cNvPr id="0" name=""/>
         <dsp:cNvSpPr/>
       </dsp:nvSpPr>
       <dsp:spPr>
         <a:xfrm>
-          <a:off x="686676" y="1108774"/>
-          <a:ext cx="8199118" cy="938193"/>
+          <a:off x="589311" y="688572"/>
+          <a:ext cx="7891651" cy="767613"/>
         </a:xfrm>
         <a:prstGeom prst="roundRect">
           <a:avLst>
@@ -4506,19 +4573,19 @@
         </a:p>
       </dsp:txBody>
       <dsp:txXfrm>
-        <a:off x="714155" y="1136253"/>
-        <a:ext cx="6847658" cy="883235"/>
+        <a:off x="611794" y="711055"/>
+        <a:ext cx="6758425" cy="722647"/>
       </dsp:txXfrm>
     </dsp:sp>
-    <dsp:sp modelId="{E5B25AD9-1221-436F-9BEE-1559CC6A21C6}">
+    <dsp:sp modelId="{9677FC07-C525-49B2-9317-7A5298FC0341}">
       <dsp:nvSpPr>
         <dsp:cNvPr id="0" name=""/>
         <dsp:cNvSpPr/>
       </dsp:nvSpPr>
       <dsp:spPr>
         <a:xfrm>
-          <a:off x="1363103" y="2217549"/>
-          <a:ext cx="8199118" cy="938193"/>
+          <a:off x="1178623" y="1562798"/>
+          <a:ext cx="7891651" cy="767613"/>
         </a:xfrm>
         <a:prstGeom prst="roundRect">
           <a:avLst>
@@ -4586,19 +4653,19 @@
         </a:p>
       </dsp:txBody>
       <dsp:txXfrm>
-        <a:off x="1390582" y="2245028"/>
-        <a:ext cx="6857907" cy="883235"/>
+        <a:off x="1201106" y="1585281"/>
+        <a:ext cx="6758425" cy="722647"/>
       </dsp:txXfrm>
     </dsp:sp>
-    <dsp:sp modelId="{48868070-824A-4F3E-A571-194B676D2C34}">
+    <dsp:sp modelId="{29B2C4B4-3757-4CC1-BBF8-78A9E22EFF8C}">
       <dsp:nvSpPr>
         <dsp:cNvPr id="0" name=""/>
         <dsp:cNvSpPr/>
       </dsp:nvSpPr>
       <dsp:spPr>
         <a:xfrm>
-          <a:off x="1342441" y="3326324"/>
-          <a:ext cx="8199118" cy="938193"/>
+          <a:off x="1767934" y="2437024"/>
+          <a:ext cx="7891651" cy="767613"/>
         </a:xfrm>
         <a:prstGeom prst="roundRect">
           <a:avLst>
@@ -4661,24 +4728,104 @@
           </a:pPr>
           <a:r>
             <a:rPr lang="en-CA" sz="1800" kern="1200" dirty="0"/>
-            <a:t>GS4: Calculate the shading for different parts of the object based on light source(s) and observer positions.</a:t>
+            <a:t>GS4: Compute the normal vectors for object(s) surfaces.</a:t>
           </a:r>
         </a:p>
       </dsp:txBody>
       <dsp:txXfrm>
-        <a:off x="1369920" y="3353803"/>
-        <a:ext cx="6847658" cy="883235"/>
+        <a:off x="1790417" y="2459507"/>
+        <a:ext cx="6758425" cy="722647"/>
       </dsp:txXfrm>
     </dsp:sp>
-    <dsp:sp modelId="{F6D6C56F-1B1F-4BD1-835F-52944CD2C2B3}">
+    <dsp:sp modelId="{8D780956-8F4C-4D0E-A227-5F2C35659D0B}">
       <dsp:nvSpPr>
         <dsp:cNvPr id="0" name=""/>
         <dsp:cNvSpPr/>
       </dsp:nvSpPr>
       <dsp:spPr>
         <a:xfrm>
-          <a:off x="7589292" y="718571"/>
-          <a:ext cx="609826" cy="609826"/>
+          <a:off x="1230555" y="3311250"/>
+          <a:ext cx="7891651" cy="767613"/>
+        </a:xfrm>
+        <a:prstGeom prst="roundRect">
+          <a:avLst>
+            <a:gd name="adj" fmla="val 10000"/>
+          </a:avLst>
+        </a:prstGeom>
+        <a:solidFill>
+          <a:schemeClr val="accent1">
+            <a:hueOff val="0"/>
+            <a:satOff val="0"/>
+            <a:lumOff val="0"/>
+            <a:alphaOff val="0"/>
+          </a:schemeClr>
+        </a:solidFill>
+        <a:ln w="12700" cap="flat" cmpd="sng" algn="ctr">
+          <a:solidFill>
+            <a:schemeClr val="lt1">
+              <a:hueOff val="0"/>
+              <a:satOff val="0"/>
+              <a:lumOff val="0"/>
+              <a:alphaOff val="0"/>
+            </a:schemeClr>
+          </a:solidFill>
+          <a:prstDash val="solid"/>
+          <a:miter lim="800000"/>
+        </a:ln>
+        <a:effectLst/>
+      </dsp:spPr>
+      <dsp:style>
+        <a:lnRef idx="2">
+          <a:scrgbClr r="0" g="0" b="0"/>
+        </a:lnRef>
+        <a:fillRef idx="1">
+          <a:scrgbClr r="0" g="0" b="0"/>
+        </a:fillRef>
+        <a:effectRef idx="0">
+          <a:scrgbClr r="0" g="0" b="0"/>
+        </a:effectRef>
+        <a:fontRef idx="minor">
+          <a:schemeClr val="lt1"/>
+        </a:fontRef>
+      </dsp:style>
+      <dsp:txBody>
+        <a:bodyPr spcFirstLastPara="0" vert="horz" wrap="square" lIns="68580" tIns="68580" rIns="68580" bIns="68580" numCol="1" spcCol="1270" anchor="ctr" anchorCtr="0">
+          <a:noAutofit/>
+        </a:bodyPr>
+        <a:lstStyle/>
+        <a:p>
+          <a:pPr marL="0" lvl="0" indent="0" algn="l" defTabSz="800100">
+            <a:lnSpc>
+              <a:spcPct val="90000"/>
+            </a:lnSpc>
+            <a:spcBef>
+              <a:spcPct val="0"/>
+            </a:spcBef>
+            <a:spcAft>
+              <a:spcPct val="35000"/>
+            </a:spcAft>
+            <a:buNone/>
+          </a:pPr>
+          <a:r>
+            <a:rPr lang="en-CA" sz="1800" kern="1200" dirty="0"/>
+            <a:t>GS5: Calculate the shading for different parts of the object based on light source(s) and observer positions.</a:t>
+          </a:r>
+        </a:p>
+      </dsp:txBody>
+      <dsp:txXfrm>
+        <a:off x="1253038" y="3333733"/>
+        <a:ext cx="6758425" cy="722647"/>
+      </dsp:txXfrm>
+    </dsp:sp>
+    <dsp:sp modelId="{6B794CBE-C3B0-4A5C-9EE7-30EC45857E19}">
+      <dsp:nvSpPr>
+        <dsp:cNvPr id="0" name=""/>
+        <dsp:cNvSpPr/>
+      </dsp:nvSpPr>
+      <dsp:spPr>
+        <a:xfrm>
+          <a:off x="7392702" y="375129"/>
+          <a:ext cx="498948" cy="498948"/>
         </a:xfrm>
         <a:prstGeom prst="downArrow">
           <a:avLst>
@@ -4725,12 +4872,12 @@
         <a:fontRef idx="minor"/>
       </dsp:style>
       <dsp:txBody>
-        <a:bodyPr spcFirstLastPara="0" vert="horz" wrap="square" lIns="34290" tIns="34290" rIns="34290" bIns="34290" numCol="1" spcCol="1270" anchor="ctr" anchorCtr="0">
+        <a:bodyPr spcFirstLastPara="0" vert="horz" wrap="square" lIns="27940" tIns="27940" rIns="27940" bIns="27940" numCol="1" spcCol="1270" anchor="ctr" anchorCtr="0">
           <a:noAutofit/>
         </a:bodyPr>
         <a:lstStyle/>
         <a:p>
-          <a:pPr marL="0" lvl="0" indent="0" algn="ctr" defTabSz="1200150">
+          <a:pPr marL="0" lvl="0" indent="0" algn="ctr" defTabSz="977900">
             <a:lnSpc>
               <a:spcPct val="90000"/>
             </a:lnSpc>
@@ -4742,23 +4889,23 @@
             </a:spcAft>
             <a:buNone/>
           </a:pPr>
-          <a:endParaRPr lang="en-CA" sz="2700" kern="1200"/>
+          <a:endParaRPr lang="en-CA" sz="2200" kern="1200"/>
         </a:p>
       </dsp:txBody>
       <dsp:txXfrm>
-        <a:off x="7726503" y="718571"/>
-        <a:ext cx="335404" cy="458894"/>
+        <a:off x="7504965" y="375129"/>
+        <a:ext cx="274422" cy="375458"/>
       </dsp:txXfrm>
     </dsp:sp>
-    <dsp:sp modelId="{967517DF-0464-4654-B6B8-5A1CB5316091}">
+    <dsp:sp modelId="{79263527-2752-4B46-87E5-B8B0AA88DA40}">
       <dsp:nvSpPr>
         <dsp:cNvPr id="0" name=""/>
         <dsp:cNvSpPr/>
       </dsp:nvSpPr>
       <dsp:spPr>
         <a:xfrm>
-          <a:off x="7741096" y="1827345"/>
-          <a:ext cx="609826" cy="609826"/>
+          <a:off x="7606440" y="1249356"/>
+          <a:ext cx="498948" cy="498948"/>
         </a:xfrm>
         <a:prstGeom prst="downArrow">
           <a:avLst>
@@ -4805,12 +4952,12 @@
         <a:fontRef idx="minor"/>
       </dsp:style>
       <dsp:txBody>
-        <a:bodyPr spcFirstLastPara="0" vert="horz" wrap="square" lIns="34290" tIns="34290" rIns="34290" bIns="34290" numCol="1" spcCol="1270" anchor="ctr" anchorCtr="0">
+        <a:bodyPr spcFirstLastPara="0" vert="horz" wrap="square" lIns="27940" tIns="27940" rIns="27940" bIns="27940" numCol="1" spcCol="1270" anchor="ctr" anchorCtr="0">
           <a:noAutofit/>
         </a:bodyPr>
         <a:lstStyle/>
         <a:p>
-          <a:pPr marL="0" lvl="0" indent="0" algn="ctr" defTabSz="1200150">
+          <a:pPr marL="0" lvl="0" indent="0" algn="ctr" defTabSz="977900">
             <a:lnSpc>
               <a:spcPct val="90000"/>
             </a:lnSpc>
@@ -4822,23 +4969,103 @@
             </a:spcAft>
             <a:buNone/>
           </a:pPr>
-          <a:endParaRPr lang="en-CA" sz="2700" kern="1200"/>
+          <a:endParaRPr lang="en-CA" sz="2200" kern="1200"/>
         </a:p>
       </dsp:txBody>
       <dsp:txXfrm>
-        <a:off x="7878307" y="1827345"/>
-        <a:ext cx="335404" cy="458894"/>
+        <a:off x="7718703" y="1249356"/>
+        <a:ext cx="274422" cy="375458"/>
       </dsp:txXfrm>
     </dsp:sp>
-    <dsp:sp modelId="{C7AAC6DE-9135-4500-BAE0-19DF8E468AB1}">
+    <dsp:sp modelId="{36C938D6-4546-4054-8CD2-E5658A3F3F16}">
       <dsp:nvSpPr>
         <dsp:cNvPr id="0" name=""/>
         <dsp:cNvSpPr/>
       </dsp:nvSpPr>
       <dsp:spPr>
         <a:xfrm>
-          <a:off x="8245028" y="1826057"/>
-          <a:ext cx="609826" cy="1875745"/>
+          <a:off x="7624157" y="2110788"/>
+          <a:ext cx="498948" cy="498948"/>
+        </a:xfrm>
+        <a:prstGeom prst="downArrow">
+          <a:avLst>
+            <a:gd name="adj1" fmla="val 55000"/>
+            <a:gd name="adj2" fmla="val 45000"/>
+          </a:avLst>
+        </a:prstGeom>
+        <a:solidFill>
+          <a:schemeClr val="accent1">
+            <a:alpha val="90000"/>
+            <a:tint val="40000"/>
+            <a:hueOff val="0"/>
+            <a:satOff val="0"/>
+            <a:lumOff val="0"/>
+            <a:alphaOff val="0"/>
+          </a:schemeClr>
+        </a:solidFill>
+        <a:ln w="12700" cap="flat" cmpd="sng" algn="ctr">
+          <a:solidFill>
+            <a:schemeClr val="accent1">
+              <a:alpha val="90000"/>
+              <a:tint val="40000"/>
+              <a:hueOff val="0"/>
+              <a:satOff val="0"/>
+              <a:lumOff val="0"/>
+              <a:alphaOff val="0"/>
+            </a:schemeClr>
+          </a:solidFill>
+          <a:prstDash val="solid"/>
+          <a:miter lim="800000"/>
+        </a:ln>
+        <a:effectLst/>
+      </dsp:spPr>
+      <dsp:style>
+        <a:lnRef idx="2">
+          <a:scrgbClr r="0" g="0" b="0"/>
+        </a:lnRef>
+        <a:fillRef idx="1">
+          <a:scrgbClr r="0" g="0" b="0"/>
+        </a:fillRef>
+        <a:effectRef idx="0">
+          <a:scrgbClr r="0" g="0" b="0"/>
+        </a:effectRef>
+        <a:fontRef idx="minor"/>
+      </dsp:style>
+      <dsp:txBody>
+        <a:bodyPr spcFirstLastPara="0" vert="horz" wrap="square" lIns="27940" tIns="27940" rIns="27940" bIns="27940" numCol="1" spcCol="1270" anchor="ctr" anchorCtr="0">
+          <a:noAutofit/>
+        </a:bodyPr>
+        <a:lstStyle/>
+        <a:p>
+          <a:pPr marL="0" lvl="0" indent="0" algn="ctr" defTabSz="977900">
+            <a:lnSpc>
+              <a:spcPct val="90000"/>
+            </a:lnSpc>
+            <a:spcBef>
+              <a:spcPct val="0"/>
+            </a:spcBef>
+            <a:spcAft>
+              <a:spcPct val="35000"/>
+            </a:spcAft>
+            <a:buNone/>
+          </a:pPr>
+          <a:endParaRPr lang="en-CA" sz="2200" kern="1200"/>
+        </a:p>
+      </dsp:txBody>
+      <dsp:txXfrm>
+        <a:off x="7736420" y="2110788"/>
+        <a:ext cx="274422" cy="375458"/>
+      </dsp:txXfrm>
+    </dsp:sp>
+    <dsp:sp modelId="{20030918-E32E-47C8-B215-FE7320BA7D37}">
+      <dsp:nvSpPr>
+        <dsp:cNvPr id="0" name=""/>
+        <dsp:cNvSpPr/>
+      </dsp:nvSpPr>
+      <dsp:spPr>
+        <a:xfrm>
+          <a:off x="8050307" y="1264529"/>
+          <a:ext cx="498948" cy="2414307"/>
         </a:xfrm>
         <a:prstGeom prst="downArrow">
           <a:avLst>
@@ -4906,8 +5133,8 @@
         </a:p>
       </dsp:txBody>
       <dsp:txXfrm>
-        <a:off x="8382239" y="1826057"/>
-        <a:ext cx="335404" cy="1724813"/>
+        <a:off x="8162570" y="1264529"/>
+        <a:ext cx="274422" cy="2290817"/>
       </dsp:txXfrm>
     </dsp:sp>
   </dsp:spTree>
@@ -14242,7 +14469,7 @@
           <a:p>
             <a:fld id="{DA0B549D-7912-47CE-BB9D-C81C46F21077}" type="datetimeFigureOut">
               <a:rPr lang="en-US" smtClean="0"/>
-              <a:t>10/2/2019</a:t>
+              <a:t>10/3/2019</a:t>
             </a:fld>
             <a:endParaRPr lang="en-US" dirty="0"/>
           </a:p>
@@ -14419,7 +14646,7 @@
           <a:p>
             <a:fld id="{93D370A3-6847-4770-BAE0-862438C62089}" type="datetimeFigureOut">
               <a:rPr lang="en-US" smtClean="0"/>
-              <a:t>10/2/2019</a:t>
+              <a:t>10/3/2019</a:t>
             </a:fld>
             <a:endParaRPr lang="en-US" dirty="0"/>
           </a:p>
@@ -14730,7 +14957,10 @@
           <a:bodyPr/>
           <a:lstStyle/>
           <a:p>
-            <a:endParaRPr lang="en-CA" dirty="0"/>
+            <a:r>
+              <a:rPr lang="en-CA" dirty="0"/>
+              <a:t>I need your help – because I’m having a hard time separating implementation details, and specifically approximation and design decisions made for implementation reasons, from the abstract details I’m looking to document here.</a:t>
+            </a:r>
           </a:p>
         </p:txBody>
       </p:sp>
@@ -14751,7 +14981,7 @@
           <a:p>
             <a:fld id="{C22109BC-39F4-43B1-850C-D5EB0E6480C8}" type="slidenum">
               <a:rPr lang="en-US" smtClean="0"/>
-              <a:t>6</a:t>
+              <a:t>1</a:t>
             </a:fld>
             <a:endParaRPr lang="en-US" dirty="0"/>
           </a:p>
@@ -14760,7 +14990,94 @@
     </p:spTree>
     <p:extLst>
       <p:ext uri="{BB962C8B-B14F-4D97-AF65-F5344CB8AC3E}">
-        <p14:creationId xmlns:p14="http://schemas.microsoft.com/office/powerpoint/2010/main" val="2324962999"/>
+        <p14:creationId xmlns:p14="http://schemas.microsoft.com/office/powerpoint/2010/main" val="3178448856"/>
+      </p:ext>
+    </p:extLst>
+  </p:cSld>
+  <p:clrMapOvr>
+    <a:masterClrMapping/>
+  </p:clrMapOvr>
+</p:notes>
+</file>
+
+<file path=ppt/notesSlides/notesSlide10.xml><?xml version="1.0" encoding="utf-8"?>
+<p:notes xmlns:a="http://schemas.openxmlformats.org/drawingml/2006/main" xmlns:r="http://schemas.openxmlformats.org/officeDocument/2006/relationships" xmlns:p="http://schemas.openxmlformats.org/presentationml/2006/main">
+  <p:cSld>
+    <p:spTree>
+      <p:nvGrpSpPr>
+        <p:cNvPr id="1" name=""/>
+        <p:cNvGrpSpPr/>
+        <p:nvPr/>
+      </p:nvGrpSpPr>
+      <p:grpSpPr>
+        <a:xfrm>
+          <a:off x="0" y="0"/>
+          <a:ext cx="0" cy="0"/>
+          <a:chOff x="0" y="0"/>
+          <a:chExt cx="0" cy="0"/>
+        </a:xfrm>
+      </p:grpSpPr>
+      <p:sp>
+        <p:nvSpPr>
+          <p:cNvPr id="2" name="Slide Image Placeholder 1"/>
+          <p:cNvSpPr>
+            <a:spLocks noGrp="1" noRot="1" noChangeAspect="1"/>
+          </p:cNvSpPr>
+          <p:nvPr>
+            <p:ph type="sldImg"/>
+          </p:nvPr>
+        </p:nvSpPr>
+        <p:spPr/>
+      </p:sp>
+      <p:sp>
+        <p:nvSpPr>
+          <p:cNvPr id="3" name="Notes Placeholder 2"/>
+          <p:cNvSpPr>
+            <a:spLocks noGrp="1"/>
+          </p:cNvSpPr>
+          <p:nvPr>
+            <p:ph type="body" idx="1"/>
+          </p:nvPr>
+        </p:nvSpPr>
+        <p:spPr/>
+        <p:txBody>
+          <a:bodyPr/>
+          <a:lstStyle/>
+          <a:p>
+            <a:r>
+              <a:rPr lang="en-CA" dirty="0"/>
+              <a:t>Should interpolation technique and reflection model be variations in input?</a:t>
+            </a:r>
+          </a:p>
+        </p:txBody>
+      </p:sp>
+      <p:sp>
+        <p:nvSpPr>
+          <p:cNvPr id="4" name="Slide Number Placeholder 3"/>
+          <p:cNvSpPr>
+            <a:spLocks noGrp="1"/>
+          </p:cNvSpPr>
+          <p:nvPr>
+            <p:ph type="sldNum" sz="quarter" idx="5"/>
+          </p:nvPr>
+        </p:nvSpPr>
+        <p:spPr/>
+        <p:txBody>
+          <a:bodyPr/>
+          <a:lstStyle/>
+          <a:p>
+            <a:fld id="{C22109BC-39F4-43B1-850C-D5EB0E6480C8}" type="slidenum">
+              <a:rPr lang="en-US" smtClean="0"/>
+              <a:t>13</a:t>
+            </a:fld>
+            <a:endParaRPr lang="en-US" dirty="0"/>
+          </a:p>
+        </p:txBody>
+      </p:sp>
+    </p:spTree>
+    <p:extLst>
+      <p:ext uri="{BB962C8B-B14F-4D97-AF65-F5344CB8AC3E}">
+        <p14:creationId xmlns:p14="http://schemas.microsoft.com/office/powerpoint/2010/main" val="275943366"/>
       </p:ext>
     </p:extLst>
   </p:cSld>
@@ -14814,15 +15131,273 @@
           <a:bodyPr/>
           <a:lstStyle/>
           <a:p>
+            <a:endParaRPr lang="en-CA" dirty="0"/>
+          </a:p>
+        </p:txBody>
+      </p:sp>
+      <p:sp>
+        <p:nvSpPr>
+          <p:cNvPr id="4" name="Slide Number Placeholder 3"/>
+          <p:cNvSpPr>
+            <a:spLocks noGrp="1"/>
+          </p:cNvSpPr>
+          <p:nvPr>
+            <p:ph type="sldNum" sz="quarter" idx="5"/>
+          </p:nvPr>
+        </p:nvSpPr>
+        <p:spPr/>
+        <p:txBody>
+          <a:bodyPr/>
+          <a:lstStyle/>
+          <a:p>
+            <a:fld id="{C22109BC-39F4-43B1-850C-D5EB0E6480C8}" type="slidenum">
+              <a:rPr lang="en-US" smtClean="0"/>
+              <a:t>3</a:t>
+            </a:fld>
+            <a:endParaRPr lang="en-US" dirty="0"/>
+          </a:p>
+        </p:txBody>
+      </p:sp>
+    </p:spTree>
+    <p:extLst>
+      <p:ext uri="{BB962C8B-B14F-4D97-AF65-F5344CB8AC3E}">
+        <p14:creationId xmlns:p14="http://schemas.microsoft.com/office/powerpoint/2010/main" val="435820804"/>
+      </p:ext>
+    </p:extLst>
+  </p:cSld>
+  <p:clrMapOvr>
+    <a:masterClrMapping/>
+  </p:clrMapOvr>
+</p:notes>
+</file>
+
+<file path=ppt/notesSlides/notesSlide3.xml><?xml version="1.0" encoding="utf-8"?>
+<p:notes xmlns:a="http://schemas.openxmlformats.org/drawingml/2006/main" xmlns:r="http://schemas.openxmlformats.org/officeDocument/2006/relationships" xmlns:p="http://schemas.openxmlformats.org/presentationml/2006/main">
+  <p:cSld>
+    <p:spTree>
+      <p:nvGrpSpPr>
+        <p:cNvPr id="1" name=""/>
+        <p:cNvGrpSpPr/>
+        <p:nvPr/>
+      </p:nvGrpSpPr>
+      <p:grpSpPr>
+        <a:xfrm>
+          <a:off x="0" y="0"/>
+          <a:ext cx="0" cy="0"/>
+          <a:chOff x="0" y="0"/>
+          <a:chExt cx="0" cy="0"/>
+        </a:xfrm>
+      </p:grpSpPr>
+      <p:sp>
+        <p:nvSpPr>
+          <p:cNvPr id="2" name="Slide Image Placeholder 1"/>
+          <p:cNvSpPr>
+            <a:spLocks noGrp="1" noRot="1" noChangeAspect="1"/>
+          </p:cNvSpPr>
+          <p:nvPr>
+            <p:ph type="sldImg"/>
+          </p:nvPr>
+        </p:nvSpPr>
+        <p:spPr/>
+      </p:sp>
+      <p:sp>
+        <p:nvSpPr>
+          <p:cNvPr id="3" name="Notes Placeholder 2"/>
+          <p:cNvSpPr>
+            <a:spLocks noGrp="1"/>
+          </p:cNvSpPr>
+          <p:nvPr>
+            <p:ph type="body" idx="1"/>
+          </p:nvPr>
+        </p:nvSpPr>
+        <p:spPr/>
+        <p:txBody>
+          <a:bodyPr/>
+          <a:lstStyle/>
+          <a:p>
+            <a:endParaRPr lang="en-CA" dirty="0"/>
+          </a:p>
+        </p:txBody>
+      </p:sp>
+      <p:sp>
+        <p:nvSpPr>
+          <p:cNvPr id="4" name="Slide Number Placeholder 3"/>
+          <p:cNvSpPr>
+            <a:spLocks noGrp="1"/>
+          </p:cNvSpPr>
+          <p:nvPr>
+            <p:ph type="sldNum" sz="quarter" idx="5"/>
+          </p:nvPr>
+        </p:nvSpPr>
+        <p:spPr/>
+        <p:txBody>
+          <a:bodyPr/>
+          <a:lstStyle/>
+          <a:p>
+            <a:fld id="{C22109BC-39F4-43B1-850C-D5EB0E6480C8}" type="slidenum">
+              <a:rPr lang="en-US" smtClean="0"/>
+              <a:t>4</a:t>
+            </a:fld>
+            <a:endParaRPr lang="en-US" dirty="0"/>
+          </a:p>
+        </p:txBody>
+      </p:sp>
+    </p:spTree>
+    <p:extLst>
+      <p:ext uri="{BB962C8B-B14F-4D97-AF65-F5344CB8AC3E}">
+        <p14:creationId xmlns:p14="http://schemas.microsoft.com/office/powerpoint/2010/main" val="1658734182"/>
+      </p:ext>
+    </p:extLst>
+  </p:cSld>
+  <p:clrMapOvr>
+    <a:masterClrMapping/>
+  </p:clrMapOvr>
+</p:notes>
+</file>
+
+<file path=ppt/notesSlides/notesSlide4.xml><?xml version="1.0" encoding="utf-8"?>
+<p:notes xmlns:a="http://schemas.openxmlformats.org/drawingml/2006/main" xmlns:r="http://schemas.openxmlformats.org/officeDocument/2006/relationships" xmlns:p="http://schemas.openxmlformats.org/presentationml/2006/main">
+  <p:cSld>
+    <p:spTree>
+      <p:nvGrpSpPr>
+        <p:cNvPr id="1" name=""/>
+        <p:cNvGrpSpPr/>
+        <p:nvPr/>
+      </p:nvGrpSpPr>
+      <p:grpSpPr>
+        <a:xfrm>
+          <a:off x="0" y="0"/>
+          <a:ext cx="0" cy="0"/>
+          <a:chOff x="0" y="0"/>
+          <a:chExt cx="0" cy="0"/>
+        </a:xfrm>
+      </p:grpSpPr>
+      <p:sp>
+        <p:nvSpPr>
+          <p:cNvPr id="2" name="Slide Image Placeholder 1"/>
+          <p:cNvSpPr>
+            <a:spLocks noGrp="1" noRot="1" noChangeAspect="1"/>
+          </p:cNvSpPr>
+          <p:nvPr>
+            <p:ph type="sldImg"/>
+          </p:nvPr>
+        </p:nvSpPr>
+        <p:spPr/>
+      </p:sp>
+      <p:sp>
+        <p:nvSpPr>
+          <p:cNvPr id="3" name="Notes Placeholder 2"/>
+          <p:cNvSpPr>
+            <a:spLocks noGrp="1"/>
+          </p:cNvSpPr>
+          <p:nvPr>
+            <p:ph type="body" idx="1"/>
+          </p:nvPr>
+        </p:nvSpPr>
+        <p:spPr/>
+        <p:txBody>
+          <a:bodyPr/>
+          <a:lstStyle/>
+          <a:p>
+            <a:endParaRPr lang="en-CA" dirty="0"/>
+          </a:p>
+        </p:txBody>
+      </p:sp>
+      <p:sp>
+        <p:nvSpPr>
+          <p:cNvPr id="4" name="Slide Number Placeholder 3"/>
+          <p:cNvSpPr>
+            <a:spLocks noGrp="1"/>
+          </p:cNvSpPr>
+          <p:nvPr>
+            <p:ph type="sldNum" sz="quarter" idx="5"/>
+          </p:nvPr>
+        </p:nvSpPr>
+        <p:spPr/>
+        <p:txBody>
+          <a:bodyPr/>
+          <a:lstStyle/>
+          <a:p>
+            <a:fld id="{C22109BC-39F4-43B1-850C-D5EB0E6480C8}" type="slidenum">
+              <a:rPr lang="en-US" smtClean="0"/>
+              <a:t>6</a:t>
+            </a:fld>
+            <a:endParaRPr lang="en-US" dirty="0"/>
+          </a:p>
+        </p:txBody>
+      </p:sp>
+    </p:spTree>
+    <p:extLst>
+      <p:ext uri="{BB962C8B-B14F-4D97-AF65-F5344CB8AC3E}">
+        <p14:creationId xmlns:p14="http://schemas.microsoft.com/office/powerpoint/2010/main" val="2324962999"/>
+      </p:ext>
+    </p:extLst>
+  </p:cSld>
+  <p:clrMapOvr>
+    <a:masterClrMapping/>
+  </p:clrMapOvr>
+</p:notes>
+</file>
+
+<file path=ppt/notesSlides/notesSlide5.xml><?xml version="1.0" encoding="utf-8"?>
+<p:notes xmlns:a="http://schemas.openxmlformats.org/drawingml/2006/main" xmlns:r="http://schemas.openxmlformats.org/officeDocument/2006/relationships" xmlns:p="http://schemas.openxmlformats.org/presentationml/2006/main">
+  <p:cSld>
+    <p:spTree>
+      <p:nvGrpSpPr>
+        <p:cNvPr id="1" name=""/>
+        <p:cNvGrpSpPr/>
+        <p:nvPr/>
+      </p:nvGrpSpPr>
+      <p:grpSpPr>
+        <a:xfrm>
+          <a:off x="0" y="0"/>
+          <a:ext cx="0" cy="0"/>
+          <a:chOff x="0" y="0"/>
+          <a:chExt cx="0" cy="0"/>
+        </a:xfrm>
+      </p:grpSpPr>
+      <p:sp>
+        <p:nvSpPr>
+          <p:cNvPr id="2" name="Slide Image Placeholder 1"/>
+          <p:cNvSpPr>
+            <a:spLocks noGrp="1" noRot="1" noChangeAspect="1"/>
+          </p:cNvSpPr>
+          <p:nvPr>
+            <p:ph type="sldImg"/>
+          </p:nvPr>
+        </p:nvSpPr>
+        <p:spPr/>
+      </p:sp>
+      <p:sp>
+        <p:nvSpPr>
+          <p:cNvPr id="3" name="Notes Placeholder 2"/>
+          <p:cNvSpPr>
+            <a:spLocks noGrp="1"/>
+          </p:cNvSpPr>
+          <p:nvPr>
+            <p:ph type="body" idx="1"/>
+          </p:nvPr>
+        </p:nvSpPr>
+        <p:spPr/>
+        <p:txBody>
+          <a:bodyPr/>
+          <a:lstStyle/>
+          <a:p>
             <a:r>
               <a:rPr lang="en-CA" dirty="0"/>
-              <a:t>Should these be general definitions or are these theoretical models?</a:t>
+              <a:t>Should these be general definitions or are these instances of the theoretical model?</a:t>
             </a:r>
           </a:p>
           <a:p>
             <a:r>
               <a:rPr lang="en-CA" dirty="0"/>
               <a:t>They both are the law of reflection, but they become relevant in shading based on material properties.</a:t>
+            </a:r>
+          </a:p>
+          <a:p>
+            <a:r>
+              <a:rPr lang="en-CA" dirty="0"/>
+              <a:t>Their distinction becomes extra important when we start making more considerations about the system.</a:t>
             </a:r>
           </a:p>
         </p:txBody>
@@ -14863,7 +15438,106 @@
 </p:notes>
 </file>
 
-<file path=ppt/notesSlides/notesSlide3.xml><?xml version="1.0" encoding="utf-8"?>
+<file path=ppt/notesSlides/notesSlide6.xml><?xml version="1.0" encoding="utf-8"?>
+<p:notes xmlns:a="http://schemas.openxmlformats.org/drawingml/2006/main" xmlns:r="http://schemas.openxmlformats.org/officeDocument/2006/relationships" xmlns:p="http://schemas.openxmlformats.org/presentationml/2006/main">
+  <p:cSld>
+    <p:spTree>
+      <p:nvGrpSpPr>
+        <p:cNvPr id="1" name=""/>
+        <p:cNvGrpSpPr/>
+        <p:nvPr/>
+      </p:nvGrpSpPr>
+      <p:grpSpPr>
+        <a:xfrm>
+          <a:off x="0" y="0"/>
+          <a:ext cx="0" cy="0"/>
+          <a:chOff x="0" y="0"/>
+          <a:chExt cx="0" cy="0"/>
+        </a:xfrm>
+      </p:grpSpPr>
+      <p:sp>
+        <p:nvSpPr>
+          <p:cNvPr id="2" name="Slide Image Placeholder 1"/>
+          <p:cNvSpPr>
+            <a:spLocks noGrp="1" noRot="1" noChangeAspect="1"/>
+          </p:cNvSpPr>
+          <p:nvPr>
+            <p:ph type="sldImg"/>
+          </p:nvPr>
+        </p:nvSpPr>
+        <p:spPr/>
+      </p:sp>
+      <p:sp>
+        <p:nvSpPr>
+          <p:cNvPr id="3" name="Notes Placeholder 2"/>
+          <p:cNvSpPr>
+            <a:spLocks noGrp="1"/>
+          </p:cNvSpPr>
+          <p:nvPr>
+            <p:ph type="body" idx="1"/>
+          </p:nvPr>
+        </p:nvSpPr>
+        <p:spPr/>
+        <p:txBody>
+          <a:bodyPr/>
+          <a:lstStyle/>
+          <a:p>
+            <a:r>
+              <a:rPr lang="en-CA" dirty="0"/>
+              <a:t>There is an implicit design decision here which I haven’t talked about because I’m not sure where to put it: global vs. local illumination.</a:t>
+            </a:r>
+          </a:p>
+          <a:p>
+            <a:r>
+              <a:rPr lang="en-CA" dirty="0"/>
+              <a:t>Generally I want this document to be written to accommodate both, and eventually I’d want it to handle both.</a:t>
+            </a:r>
+          </a:p>
+          <a:p>
+            <a:r>
+              <a:rPr lang="en-CA" dirty="0"/>
+              <a:t>This distinction only makes sense in the context of graphics implementation – because all real world lighting is both global and local.</a:t>
+            </a:r>
+          </a:p>
+        </p:txBody>
+      </p:sp>
+      <p:sp>
+        <p:nvSpPr>
+          <p:cNvPr id="4" name="Slide Number Placeholder 3"/>
+          <p:cNvSpPr>
+            <a:spLocks noGrp="1"/>
+          </p:cNvSpPr>
+          <p:nvPr>
+            <p:ph type="sldNum" sz="quarter" idx="5"/>
+          </p:nvPr>
+        </p:nvSpPr>
+        <p:spPr/>
+        <p:txBody>
+          <a:bodyPr/>
+          <a:lstStyle/>
+          <a:p>
+            <a:fld id="{C22109BC-39F4-43B1-850C-D5EB0E6480C8}" type="slidenum">
+              <a:rPr lang="en-US" smtClean="0"/>
+              <a:t>9</a:t>
+            </a:fld>
+            <a:endParaRPr lang="en-US" dirty="0"/>
+          </a:p>
+        </p:txBody>
+      </p:sp>
+    </p:spTree>
+    <p:extLst>
+      <p:ext uri="{BB962C8B-B14F-4D97-AF65-F5344CB8AC3E}">
+        <p14:creationId xmlns:p14="http://schemas.microsoft.com/office/powerpoint/2010/main" val="3939391112"/>
+      </p:ext>
+    </p:extLst>
+  </p:cSld>
+  <p:clrMapOvr>
+    <a:masterClrMapping/>
+  </p:clrMapOvr>
+</p:notes>
+</file>
+
+<file path=ppt/notesSlides/notesSlide7.xml><?xml version="1.0" encoding="utf-8"?>
 <p:notes xmlns:a="http://schemas.openxmlformats.org/drawingml/2006/main" xmlns:r="http://schemas.openxmlformats.org/officeDocument/2006/relationships" xmlns:p="http://schemas.openxmlformats.org/presentationml/2006/main">
   <p:cSld>
     <p:spTree>
@@ -14950,7 +15624,7 @@
 </p:notes>
 </file>
 
-<file path=ppt/notesSlides/notesSlide4.xml><?xml version="1.0" encoding="utf-8"?>
+<file path=ppt/notesSlides/notesSlide8.xml><?xml version="1.0" encoding="utf-8"?>
 <p:notes xmlns:a="http://schemas.openxmlformats.org/drawingml/2006/main" xmlns:r="http://schemas.openxmlformats.org/officeDocument/2006/relationships" xmlns:p="http://schemas.openxmlformats.org/presentationml/2006/main">
   <p:cSld>
     <p:spTree>
@@ -15037,7 +15711,7 @@
 </p:notes>
 </file>
 
-<file path=ppt/notesSlides/notesSlide5.xml><?xml version="1.0" encoding="utf-8"?>
+<file path=ppt/notesSlides/notesSlide9.xml><?xml version="1.0" encoding="utf-8"?>
 <p:notes xmlns:a="http://schemas.openxmlformats.org/drawingml/2006/main" xmlns:r="http://schemas.openxmlformats.org/officeDocument/2006/relationships" xmlns:p="http://schemas.openxmlformats.org/presentationml/2006/main">
   <p:cSld>
     <p:spTree>
@@ -15092,6 +15766,15 @@
               <a:t>This may change depending on project.</a:t>
             </a:r>
           </a:p>
+          <a:p>
+            <a:endParaRPr lang="en-CA" dirty="0"/>
+          </a:p>
+          <a:p>
+            <a:r>
+              <a:rPr lang="en-CA" dirty="0"/>
+              <a:t>The global vs. local illumination adds more theoretical models because global illumination imposes more rules on geometrical optics using things like bi-directional reflective distribution functions which are based on more complex integrals that define some of light’s properties.</a:t>
+            </a:r>
+          </a:p>
         </p:txBody>
       </p:sp>
       <p:sp>
@@ -15121,93 +15804,6 @@
     <p:extLst>
       <p:ext uri="{BB962C8B-B14F-4D97-AF65-F5344CB8AC3E}">
         <p14:creationId xmlns:p14="http://schemas.microsoft.com/office/powerpoint/2010/main" val="1197134416"/>
-      </p:ext>
-    </p:extLst>
-  </p:cSld>
-  <p:clrMapOvr>
-    <a:masterClrMapping/>
-  </p:clrMapOvr>
-</p:notes>
-</file>
-
-<file path=ppt/notesSlides/notesSlide6.xml><?xml version="1.0" encoding="utf-8"?>
-<p:notes xmlns:a="http://schemas.openxmlformats.org/drawingml/2006/main" xmlns:r="http://schemas.openxmlformats.org/officeDocument/2006/relationships" xmlns:p="http://schemas.openxmlformats.org/presentationml/2006/main">
-  <p:cSld>
-    <p:spTree>
-      <p:nvGrpSpPr>
-        <p:cNvPr id="1" name=""/>
-        <p:cNvGrpSpPr/>
-        <p:nvPr/>
-      </p:nvGrpSpPr>
-      <p:grpSpPr>
-        <a:xfrm>
-          <a:off x="0" y="0"/>
-          <a:ext cx="0" cy="0"/>
-          <a:chOff x="0" y="0"/>
-          <a:chExt cx="0" cy="0"/>
-        </a:xfrm>
-      </p:grpSpPr>
-      <p:sp>
-        <p:nvSpPr>
-          <p:cNvPr id="2" name="Slide Image Placeholder 1"/>
-          <p:cNvSpPr>
-            <a:spLocks noGrp="1" noRot="1" noChangeAspect="1"/>
-          </p:cNvSpPr>
-          <p:nvPr>
-            <p:ph type="sldImg"/>
-          </p:nvPr>
-        </p:nvSpPr>
-        <p:spPr/>
-      </p:sp>
-      <p:sp>
-        <p:nvSpPr>
-          <p:cNvPr id="3" name="Notes Placeholder 2"/>
-          <p:cNvSpPr>
-            <a:spLocks noGrp="1"/>
-          </p:cNvSpPr>
-          <p:nvPr>
-            <p:ph type="body" idx="1"/>
-          </p:nvPr>
-        </p:nvSpPr>
-        <p:spPr/>
-        <p:txBody>
-          <a:bodyPr/>
-          <a:lstStyle/>
-          <a:p>
-            <a:r>
-              <a:rPr lang="en-CA" dirty="0"/>
-              <a:t>Should interpolation technique and reflection model be variations in input?</a:t>
-            </a:r>
-          </a:p>
-        </p:txBody>
-      </p:sp>
-      <p:sp>
-        <p:nvSpPr>
-          <p:cNvPr id="4" name="Slide Number Placeholder 3"/>
-          <p:cNvSpPr>
-            <a:spLocks noGrp="1"/>
-          </p:cNvSpPr>
-          <p:nvPr>
-            <p:ph type="sldNum" sz="quarter" idx="5"/>
-          </p:nvPr>
-        </p:nvSpPr>
-        <p:spPr/>
-        <p:txBody>
-          <a:bodyPr/>
-          <a:lstStyle/>
-          <a:p>
-            <a:fld id="{C22109BC-39F4-43B1-850C-D5EB0E6480C8}" type="slidenum">
-              <a:rPr lang="en-US" smtClean="0"/>
-              <a:t>13</a:t>
-            </a:fld>
-            <a:endParaRPr lang="en-US" dirty="0"/>
-          </a:p>
-        </p:txBody>
-      </p:sp>
-    </p:spTree>
-    <p:extLst>
-      <p:ext uri="{BB962C8B-B14F-4D97-AF65-F5344CB8AC3E}">
-        <p14:creationId xmlns:p14="http://schemas.microsoft.com/office/powerpoint/2010/main" val="275943366"/>
       </p:ext>
     </p:extLst>
   </p:cSld>
@@ -20861,7 +21457,7 @@
           </a:ln>
           <a:extLst>
             <a:ext uri="{C572A759-6A51-4108-AA02-DFA0A04FC94B}">
-              <ma14:wrappingTextBoxFlag xmlns="" xmlns:ma14="http://schemas.microsoft.com/office/mac/drawingml/2011/main" val="1"/>
+              <ma14:wrappingTextBoxFlag xmlns:ma14="http://schemas.microsoft.com/office/mac/drawingml/2011/main" xmlns="" val="1"/>
             </a:ext>
           </a:extLst>
         </p:spPr>
@@ -21785,8 +22381,8 @@
         </p:nvSpPr>
         <p:spPr>
           <a:xfrm>
-            <a:off x="1104900" y="1352551"/>
-            <a:ext cx="8708801" cy="4803550"/>
+            <a:off x="1104900" y="1068404"/>
+            <a:ext cx="8708801" cy="5624225"/>
           </a:xfrm>
         </p:spPr>
         <p:txBody>
@@ -21831,6 +22427,13 @@
             </a:r>
           </a:p>
           <a:p>
+            <a:pPr lvl="1"/>
+            <a:r>
+              <a:rPr lang="en-CA" dirty="0"/>
+              <a:t>Number of objects</a:t>
+            </a:r>
+          </a:p>
+          <a:p>
             <a:r>
               <a:rPr lang="en-CA" dirty="0"/>
               <a:t>Light source</a:t>
@@ -21868,7 +22471,7 @@
                   <a:schemeClr val="accent1"/>
                 </a:solidFill>
               </a:rPr>
-              <a:t>By vertex, by mesh geometry, continuous</a:t>
+              <a:t>None, by vertex, by mesh geometry, continuous</a:t>
             </a:r>
           </a:p>
           <a:p>
@@ -21879,6 +22482,16 @@
                 </a:solidFill>
               </a:rPr>
               <a:t>Reflection Model</a:t>
+            </a:r>
+          </a:p>
+          <a:p>
+            <a:r>
+              <a:rPr lang="en-CA" dirty="0">
+                <a:solidFill>
+                  <a:schemeClr val="accent1"/>
+                </a:solidFill>
+              </a:rPr>
+              <a:t>Global vs. local illumination</a:t>
             </a:r>
           </a:p>
           <a:p>
@@ -21990,7 +22603,7 @@
             <a:pPr lvl="1"/>
             <a:r>
               <a:rPr lang="en-CA" dirty="0"/>
-              <a:t>Function call.</a:t>
+              <a:t>Function call inside a program.</a:t>
             </a:r>
           </a:p>
         </p:txBody>
@@ -22592,7 +23205,7 @@
         </p:xfrm>
         <a:graphic>
           <a:graphicData uri="http://schemas.openxmlformats.org/drawingml/2006/diagram">
-            <dgm:relIds xmlns:dgm="http://schemas.openxmlformats.org/drawingml/2006/diagram" xmlns:r="http://schemas.openxmlformats.org/officeDocument/2006/relationships" r:dm="rId2" r:lo="rId3" r:qs="rId4" r:cs="rId5"/>
+            <dgm:relIds xmlns:dgm="http://schemas.openxmlformats.org/drawingml/2006/diagram" xmlns:r="http://schemas.openxmlformats.org/officeDocument/2006/relationships" r:dm="rId3" r:lo="rId4" r:qs="rId5" r:cs="rId6"/>
           </a:graphicData>
         </a:graphic>
       </p:graphicFrame>
@@ -22827,6 +23440,41 @@
           </a:p>
         </p:txBody>
       </p:sp>
+      <p:sp>
+        <p:nvSpPr>
+          <p:cNvPr id="11" name="TextBox 10">
+            <a:extLst>
+              <a:ext uri="{FF2B5EF4-FFF2-40B4-BE49-F238E27FC236}">
+                <a16:creationId xmlns:a16="http://schemas.microsoft.com/office/drawing/2014/main" id="{11741BE6-59E8-4343-89A9-17E8C247447E}"/>
+              </a:ext>
+            </a:extLst>
+          </p:cNvPr>
+          <p:cNvSpPr txBox="1"/>
+          <p:nvPr/>
+        </p:nvSpPr>
+        <p:spPr>
+          <a:xfrm>
+            <a:off x="3570520" y="6049478"/>
+            <a:ext cx="1349344" cy="369332"/>
+          </a:xfrm>
+          <a:prstGeom prst="rect">
+            <a:avLst/>
+          </a:prstGeom>
+          <a:noFill/>
+        </p:spPr>
+        <p:txBody>
+          <a:bodyPr wrap="none" rtlCol="0">
+            <a:spAutoFit/>
+          </a:bodyPr>
+          <a:lstStyle/>
+          <a:p>
+            <a:r>
+              <a:rPr lang="en-CA" dirty="0"/>
+              <a:t>Wave Optics</a:t>
+            </a:r>
+          </a:p>
+        </p:txBody>
+      </p:sp>
     </p:spTree>
     <p:extLst>
       <p:ext uri="{BB962C8B-B14F-4D97-AF65-F5344CB8AC3E}">
@@ -22950,7 +23598,7 @@
           <p:nvPr/>
         </p:nvPicPr>
         <p:blipFill>
-          <a:blip r:embed="rId2"/>
+          <a:blip r:embed="rId3"/>
           <a:stretch>
             <a:fillRect/>
           </a:stretch>
@@ -22965,6 +23613,267 @@
           </a:prstGeom>
         </p:spPr>
       </p:pic>
+      <p:sp>
+        <p:nvSpPr>
+          <p:cNvPr id="4" name="Arrow: Right 3">
+            <a:extLst>
+              <a:ext uri="{FF2B5EF4-FFF2-40B4-BE49-F238E27FC236}">
+                <a16:creationId xmlns:a16="http://schemas.microsoft.com/office/drawing/2014/main" id="{230B2901-2A00-444D-BE18-21CFE97E6B33}"/>
+              </a:ext>
+            </a:extLst>
+          </p:cNvPr>
+          <p:cNvSpPr/>
+          <p:nvPr/>
+        </p:nvSpPr>
+        <p:spPr>
+          <a:xfrm>
+            <a:off x="577668" y="5650030"/>
+            <a:ext cx="10248899" cy="1150219"/>
+          </a:xfrm>
+          <a:prstGeom prst="rightArrow">
+            <a:avLst/>
+          </a:prstGeom>
+          <a:solidFill>
+            <a:schemeClr val="accent1">
+              <a:alpha val="42000"/>
+            </a:schemeClr>
+          </a:solidFill>
+        </p:spPr>
+        <p:style>
+          <a:lnRef idx="2">
+            <a:schemeClr val="accent1">
+              <a:shade val="50000"/>
+            </a:schemeClr>
+          </a:lnRef>
+          <a:fillRef idx="1">
+            <a:schemeClr val="accent1"/>
+          </a:fillRef>
+          <a:effectRef idx="0">
+            <a:schemeClr val="accent1"/>
+          </a:effectRef>
+          <a:fontRef idx="minor">
+            <a:schemeClr val="lt1"/>
+          </a:fontRef>
+        </p:style>
+        <p:txBody>
+          <a:bodyPr rtlCol="0" anchor="ctr"/>
+          <a:lstStyle/>
+          <a:p>
+            <a:pPr algn="ctr"/>
+            <a:endParaRPr lang="en-CA" dirty="0"/>
+          </a:p>
+        </p:txBody>
+      </p:sp>
+      <p:sp>
+        <p:nvSpPr>
+          <p:cNvPr id="5" name="TextBox 4">
+            <a:extLst>
+              <a:ext uri="{FF2B5EF4-FFF2-40B4-BE49-F238E27FC236}">
+                <a16:creationId xmlns:a16="http://schemas.microsoft.com/office/drawing/2014/main" id="{1C2A2F31-0D29-48D2-B161-EB9ED7230C59}"/>
+              </a:ext>
+            </a:extLst>
+          </p:cNvPr>
+          <p:cNvSpPr txBox="1"/>
+          <p:nvPr/>
+        </p:nvSpPr>
+        <p:spPr>
+          <a:xfrm>
+            <a:off x="725715" y="6040473"/>
+            <a:ext cx="1317284" cy="369332"/>
+          </a:xfrm>
+          <a:prstGeom prst="rect">
+            <a:avLst/>
+          </a:prstGeom>
+          <a:noFill/>
+        </p:spPr>
+        <p:txBody>
+          <a:bodyPr wrap="none" rtlCol="0">
+            <a:spAutoFit/>
+          </a:bodyPr>
+          <a:lstStyle/>
+          <a:p>
+            <a:r>
+              <a:rPr lang="en-CA" dirty="0"/>
+              <a:t>Light source</a:t>
+            </a:r>
+          </a:p>
+        </p:txBody>
+      </p:sp>
+      <p:sp>
+        <p:nvSpPr>
+          <p:cNvPr id="6" name="TextBox 5">
+            <a:extLst>
+              <a:ext uri="{FF2B5EF4-FFF2-40B4-BE49-F238E27FC236}">
+                <a16:creationId xmlns:a16="http://schemas.microsoft.com/office/drawing/2014/main" id="{C2E8A7C7-FAE5-407E-99C4-51A2E609BA9A}"/>
+              </a:ext>
+            </a:extLst>
+          </p:cNvPr>
+          <p:cNvSpPr txBox="1"/>
+          <p:nvPr/>
+        </p:nvSpPr>
+        <p:spPr>
+          <a:xfrm>
+            <a:off x="2285463" y="6040473"/>
+            <a:ext cx="1042593" cy="369332"/>
+          </a:xfrm>
+          <a:prstGeom prst="rect">
+            <a:avLst/>
+          </a:prstGeom>
+          <a:noFill/>
+        </p:spPr>
+        <p:txBody>
+          <a:bodyPr wrap="none" rtlCol="0">
+            <a:spAutoFit/>
+          </a:bodyPr>
+          <a:lstStyle/>
+          <a:p>
+            <a:r>
+              <a:rPr lang="en-CA" dirty="0"/>
+              <a:t>Observer</a:t>
+            </a:r>
+          </a:p>
+        </p:txBody>
+      </p:sp>
+      <p:sp>
+        <p:nvSpPr>
+          <p:cNvPr id="7" name="TextBox 6">
+            <a:extLst>
+              <a:ext uri="{FF2B5EF4-FFF2-40B4-BE49-F238E27FC236}">
+                <a16:creationId xmlns:a16="http://schemas.microsoft.com/office/drawing/2014/main" id="{6A2AB96F-CB4C-43A3-A5EF-159DC33BAAA3}"/>
+              </a:ext>
+            </a:extLst>
+          </p:cNvPr>
+          <p:cNvSpPr txBox="1"/>
+          <p:nvPr/>
+        </p:nvSpPr>
+        <p:spPr>
+          <a:xfrm>
+            <a:off x="621742" y="5609487"/>
+            <a:ext cx="1667508" cy="369332"/>
+          </a:xfrm>
+          <a:prstGeom prst="rect">
+            <a:avLst/>
+          </a:prstGeom>
+          <a:noFill/>
+        </p:spPr>
+        <p:txBody>
+          <a:bodyPr wrap="none" rtlCol="0">
+            <a:spAutoFit/>
+          </a:bodyPr>
+          <a:lstStyle/>
+          <a:p>
+            <a:r>
+              <a:rPr lang="en-CA" dirty="0"/>
+              <a:t>Words to know:</a:t>
+            </a:r>
+          </a:p>
+        </p:txBody>
+      </p:sp>
+      <p:sp>
+        <p:nvSpPr>
+          <p:cNvPr id="9" name="TextBox 8">
+            <a:extLst>
+              <a:ext uri="{FF2B5EF4-FFF2-40B4-BE49-F238E27FC236}">
+                <a16:creationId xmlns:a16="http://schemas.microsoft.com/office/drawing/2014/main" id="{3D591214-BF65-4652-8B78-23EBF4995BBD}"/>
+              </a:ext>
+            </a:extLst>
+          </p:cNvPr>
+          <p:cNvSpPr txBox="1"/>
+          <p:nvPr/>
+        </p:nvSpPr>
+        <p:spPr>
+          <a:xfrm>
+            <a:off x="3570520" y="6040473"/>
+            <a:ext cx="860300" cy="369332"/>
+          </a:xfrm>
+          <a:prstGeom prst="rect">
+            <a:avLst/>
+          </a:prstGeom>
+          <a:noFill/>
+        </p:spPr>
+        <p:txBody>
+          <a:bodyPr wrap="none" rtlCol="0">
+            <a:spAutoFit/>
+          </a:bodyPr>
+          <a:lstStyle/>
+          <a:p>
+            <a:r>
+              <a:rPr lang="en-CA" dirty="0"/>
+              <a:t>Render</a:t>
+            </a:r>
+          </a:p>
+        </p:txBody>
+      </p:sp>
+      <p:sp>
+        <p:nvSpPr>
+          <p:cNvPr id="10" name="TextBox 9">
+            <a:extLst>
+              <a:ext uri="{FF2B5EF4-FFF2-40B4-BE49-F238E27FC236}">
+                <a16:creationId xmlns:a16="http://schemas.microsoft.com/office/drawing/2014/main" id="{A9452B21-0AAF-43FE-BA8C-6378CE42EEF7}"/>
+              </a:ext>
+            </a:extLst>
+          </p:cNvPr>
+          <p:cNvSpPr txBox="1"/>
+          <p:nvPr/>
+        </p:nvSpPr>
+        <p:spPr>
+          <a:xfrm>
+            <a:off x="4673284" y="6040473"/>
+            <a:ext cx="1627369" cy="369332"/>
+          </a:xfrm>
+          <a:prstGeom prst="rect">
+            <a:avLst/>
+          </a:prstGeom>
+          <a:noFill/>
+        </p:spPr>
+        <p:txBody>
+          <a:bodyPr wrap="none" rtlCol="0">
+            <a:spAutoFit/>
+          </a:bodyPr>
+          <a:lstStyle/>
+          <a:p>
+            <a:r>
+              <a:rPr lang="en-CA" dirty="0"/>
+              <a:t>Shaded/Shader</a:t>
+            </a:r>
+          </a:p>
+        </p:txBody>
+      </p:sp>
+      <p:sp>
+        <p:nvSpPr>
+          <p:cNvPr id="11" name="TextBox 10">
+            <a:extLst>
+              <a:ext uri="{FF2B5EF4-FFF2-40B4-BE49-F238E27FC236}">
+                <a16:creationId xmlns:a16="http://schemas.microsoft.com/office/drawing/2014/main" id="{1A99FFAE-F3FB-4DA5-8938-7EE92C5295DE}"/>
+              </a:ext>
+            </a:extLst>
+          </p:cNvPr>
+          <p:cNvSpPr txBox="1"/>
+          <p:nvPr/>
+        </p:nvSpPr>
+        <p:spPr>
+          <a:xfrm>
+            <a:off x="6543117" y="6040473"/>
+            <a:ext cx="412292" cy="369332"/>
+          </a:xfrm>
+          <a:prstGeom prst="rect">
+            <a:avLst/>
+          </a:prstGeom>
+          <a:noFill/>
+        </p:spPr>
+        <p:txBody>
+          <a:bodyPr wrap="none" rtlCol="0">
+            <a:spAutoFit/>
+          </a:bodyPr>
+          <a:lstStyle/>
+          <a:p>
+            <a:r>
+              <a:rPr lang="en-CA" dirty="0"/>
+              <a:t>Lit</a:t>
+            </a:r>
+          </a:p>
+        </p:txBody>
+      </p:sp>
     </p:spTree>
     <p:extLst>
       <p:ext uri="{BB962C8B-B14F-4D97-AF65-F5344CB8AC3E}">
@@ -23072,7 +23981,7 @@
           <p:nvPr>
             <p:extLst>
               <p:ext uri="{D42A27DB-BD31-4B8C-83A1-F6EECF244321}">
-                <p14:modId xmlns:p14="http://schemas.microsoft.com/office/powerpoint/2010/main" val="3869021422"/>
+                <p14:modId xmlns:p14="http://schemas.microsoft.com/office/powerpoint/2010/main" val="805257838"/>
               </p:ext>
             </p:extLst>
           </p:nvPr>
@@ -23150,36 +24059,6 @@
           </a:p>
         </p:txBody>
       </p:sp>
-      <p:sp>
-        <p:nvSpPr>
-          <p:cNvPr id="7" name="Text Placeholder 6">
-            <a:extLst>
-              <a:ext uri="{FF2B5EF4-FFF2-40B4-BE49-F238E27FC236}">
-                <a16:creationId xmlns:a16="http://schemas.microsoft.com/office/drawing/2014/main" id="{287FA740-C05D-477F-B40B-278BC08136F3}"/>
-              </a:ext>
-            </a:extLst>
-          </p:cNvPr>
-          <p:cNvSpPr>
-            <a:spLocks noGrp="1"/>
-          </p:cNvSpPr>
-          <p:nvPr>
-            <p:ph type="body" idx="1"/>
-          </p:nvPr>
-        </p:nvSpPr>
-        <p:spPr>
-          <a:xfrm>
-            <a:off x="1533143" y="5156752"/>
-            <a:ext cx="9750208" cy="1433830"/>
-          </a:xfrm>
-        </p:spPr>
-        <p:txBody>
-          <a:bodyPr/>
-          <a:lstStyle/>
-          <a:p>
-            <a:endParaRPr lang="en-CA" dirty="0"/>
-          </a:p>
-        </p:txBody>
-      </p:sp>
       <p:pic>
         <p:nvPicPr>
           <p:cNvPr id="6" name="Picture 5">
@@ -23209,6 +24088,232 @@
           </a:prstGeom>
         </p:spPr>
       </p:pic>
+      <p:sp>
+        <p:nvSpPr>
+          <p:cNvPr id="5" name="Arrow: Right 4">
+            <a:extLst>
+              <a:ext uri="{FF2B5EF4-FFF2-40B4-BE49-F238E27FC236}">
+                <a16:creationId xmlns:a16="http://schemas.microsoft.com/office/drawing/2014/main" id="{6CC581A1-7175-4E9E-A2A3-A53DC791C08B}"/>
+              </a:ext>
+            </a:extLst>
+          </p:cNvPr>
+          <p:cNvSpPr/>
+          <p:nvPr/>
+        </p:nvSpPr>
+        <p:spPr>
+          <a:xfrm>
+            <a:off x="577668" y="5650030"/>
+            <a:ext cx="10248899" cy="1150219"/>
+          </a:xfrm>
+          <a:prstGeom prst="rightArrow">
+            <a:avLst/>
+          </a:prstGeom>
+          <a:solidFill>
+            <a:schemeClr val="accent1">
+              <a:alpha val="42000"/>
+            </a:schemeClr>
+          </a:solidFill>
+        </p:spPr>
+        <p:style>
+          <a:lnRef idx="2">
+            <a:schemeClr val="accent1">
+              <a:shade val="50000"/>
+            </a:schemeClr>
+          </a:lnRef>
+          <a:fillRef idx="1">
+            <a:schemeClr val="accent1"/>
+          </a:fillRef>
+          <a:effectRef idx="0">
+            <a:schemeClr val="accent1"/>
+          </a:effectRef>
+          <a:fontRef idx="minor">
+            <a:schemeClr val="lt1"/>
+          </a:fontRef>
+        </p:style>
+        <p:txBody>
+          <a:bodyPr rtlCol="0" anchor="ctr"/>
+          <a:lstStyle/>
+          <a:p>
+            <a:pPr algn="ctr"/>
+            <a:endParaRPr lang="en-CA" dirty="0"/>
+          </a:p>
+        </p:txBody>
+      </p:sp>
+      <p:sp>
+        <p:nvSpPr>
+          <p:cNvPr id="8" name="TextBox 7">
+            <a:extLst>
+              <a:ext uri="{FF2B5EF4-FFF2-40B4-BE49-F238E27FC236}">
+                <a16:creationId xmlns:a16="http://schemas.microsoft.com/office/drawing/2014/main" id="{1035C4DE-AD33-4139-9252-55134DA5B06C}"/>
+              </a:ext>
+            </a:extLst>
+          </p:cNvPr>
+          <p:cNvSpPr txBox="1"/>
+          <p:nvPr/>
+        </p:nvSpPr>
+        <p:spPr>
+          <a:xfrm>
+            <a:off x="725715" y="6040473"/>
+            <a:ext cx="1912703" cy="369332"/>
+          </a:xfrm>
+          <a:prstGeom prst="rect">
+            <a:avLst/>
+          </a:prstGeom>
+          <a:noFill/>
+        </p:spPr>
+        <p:txBody>
+          <a:bodyPr wrap="none" rtlCol="0">
+            <a:spAutoFit/>
+          </a:bodyPr>
+          <a:lstStyle/>
+          <a:p>
+            <a:r>
+              <a:rPr lang="en-CA" dirty="0"/>
+              <a:t>Angle of incidence</a:t>
+            </a:r>
+          </a:p>
+        </p:txBody>
+      </p:sp>
+      <p:sp>
+        <p:nvSpPr>
+          <p:cNvPr id="9" name="TextBox 8">
+            <a:extLst>
+              <a:ext uri="{FF2B5EF4-FFF2-40B4-BE49-F238E27FC236}">
+                <a16:creationId xmlns:a16="http://schemas.microsoft.com/office/drawing/2014/main" id="{7400FD03-F010-4B2F-BCB5-4E2300C9B000}"/>
+              </a:ext>
+            </a:extLst>
+          </p:cNvPr>
+          <p:cNvSpPr txBox="1"/>
+          <p:nvPr/>
+        </p:nvSpPr>
+        <p:spPr>
+          <a:xfrm>
+            <a:off x="2833722" y="6040473"/>
+            <a:ext cx="1337226" cy="369332"/>
+          </a:xfrm>
+          <a:prstGeom prst="rect">
+            <a:avLst/>
+          </a:prstGeom>
+          <a:noFill/>
+        </p:spPr>
+        <p:txBody>
+          <a:bodyPr wrap="none" rtlCol="0">
+            <a:spAutoFit/>
+          </a:bodyPr>
+          <a:lstStyle/>
+          <a:p>
+            <a:r>
+              <a:rPr lang="en-CA" dirty="0"/>
+              <a:t>Incident Ray</a:t>
+            </a:r>
+          </a:p>
+        </p:txBody>
+      </p:sp>
+      <p:sp>
+        <p:nvSpPr>
+          <p:cNvPr id="10" name="TextBox 9">
+            <a:extLst>
+              <a:ext uri="{FF2B5EF4-FFF2-40B4-BE49-F238E27FC236}">
+                <a16:creationId xmlns:a16="http://schemas.microsoft.com/office/drawing/2014/main" id="{B4601D85-7941-41C8-BAFD-5C843CEBFA62}"/>
+              </a:ext>
+            </a:extLst>
+          </p:cNvPr>
+          <p:cNvSpPr txBox="1"/>
+          <p:nvPr/>
+        </p:nvSpPr>
+        <p:spPr>
+          <a:xfrm>
+            <a:off x="621742" y="5609487"/>
+            <a:ext cx="1667508" cy="369332"/>
+          </a:xfrm>
+          <a:prstGeom prst="rect">
+            <a:avLst/>
+          </a:prstGeom>
+          <a:noFill/>
+        </p:spPr>
+        <p:txBody>
+          <a:bodyPr wrap="none" rtlCol="0">
+            <a:spAutoFit/>
+          </a:bodyPr>
+          <a:lstStyle/>
+          <a:p>
+            <a:r>
+              <a:rPr lang="en-CA" dirty="0"/>
+              <a:t>Words to know:</a:t>
+            </a:r>
+          </a:p>
+        </p:txBody>
+      </p:sp>
+      <p:sp>
+        <p:nvSpPr>
+          <p:cNvPr id="12" name="TextBox 11">
+            <a:extLst>
+              <a:ext uri="{FF2B5EF4-FFF2-40B4-BE49-F238E27FC236}">
+                <a16:creationId xmlns:a16="http://schemas.microsoft.com/office/drawing/2014/main" id="{4E477224-17DE-48D4-AFF3-33FCECBD369F}"/>
+              </a:ext>
+            </a:extLst>
+          </p:cNvPr>
+          <p:cNvSpPr txBox="1"/>
+          <p:nvPr/>
+        </p:nvSpPr>
+        <p:spPr>
+          <a:xfrm>
+            <a:off x="4364891" y="6040473"/>
+            <a:ext cx="883575" cy="369332"/>
+          </a:xfrm>
+          <a:prstGeom prst="rect">
+            <a:avLst/>
+          </a:prstGeom>
+          <a:noFill/>
+        </p:spPr>
+        <p:txBody>
+          <a:bodyPr wrap="none" rtlCol="0">
+            <a:spAutoFit/>
+          </a:bodyPr>
+          <a:lstStyle/>
+          <a:p>
+            <a:r>
+              <a:rPr lang="en-CA" dirty="0"/>
+              <a:t>Normal</a:t>
+            </a:r>
+          </a:p>
+        </p:txBody>
+      </p:sp>
+      <p:sp>
+        <p:nvSpPr>
+          <p:cNvPr id="13" name="TextBox 12">
+            <a:extLst>
+              <a:ext uri="{FF2B5EF4-FFF2-40B4-BE49-F238E27FC236}">
+                <a16:creationId xmlns:a16="http://schemas.microsoft.com/office/drawing/2014/main" id="{BF29250E-1344-4C00-BE9A-0E04CF0CD3BC}"/>
+              </a:ext>
+            </a:extLst>
+          </p:cNvPr>
+          <p:cNvSpPr txBox="1"/>
+          <p:nvPr/>
+        </p:nvSpPr>
+        <p:spPr>
+          <a:xfrm>
+            <a:off x="5442409" y="6040473"/>
+            <a:ext cx="1314271" cy="369332"/>
+          </a:xfrm>
+          <a:prstGeom prst="rect">
+            <a:avLst/>
+          </a:prstGeom>
+          <a:noFill/>
+        </p:spPr>
+        <p:txBody>
+          <a:bodyPr wrap="none" rtlCol="0">
+            <a:spAutoFit/>
+          </a:bodyPr>
+          <a:lstStyle/>
+          <a:p>
+            <a:r>
+              <a:rPr lang="en-CA" dirty="0"/>
+              <a:t>Dot Product</a:t>
+            </a:r>
+          </a:p>
+        </p:txBody>
+      </p:sp>
     </p:spTree>
     <p:extLst>
       <p:ext uri="{BB962C8B-B14F-4D97-AF65-F5344CB8AC3E}">
@@ -23272,36 +24377,6 @@
           </a:p>
         </p:txBody>
       </p:sp>
-      <p:sp>
-        <p:nvSpPr>
-          <p:cNvPr id="7" name="Text Placeholder 6">
-            <a:extLst>
-              <a:ext uri="{FF2B5EF4-FFF2-40B4-BE49-F238E27FC236}">
-                <a16:creationId xmlns:a16="http://schemas.microsoft.com/office/drawing/2014/main" id="{287FA740-C05D-477F-B40B-278BC08136F3}"/>
-              </a:ext>
-            </a:extLst>
-          </p:cNvPr>
-          <p:cNvSpPr>
-            <a:spLocks noGrp="1"/>
-          </p:cNvSpPr>
-          <p:nvPr>
-            <p:ph type="body" idx="1"/>
-          </p:nvPr>
-        </p:nvSpPr>
-        <p:spPr>
-          <a:xfrm>
-            <a:off x="1533143" y="5156752"/>
-            <a:ext cx="9750208" cy="1433830"/>
-          </a:xfrm>
-        </p:spPr>
-        <p:txBody>
-          <a:bodyPr/>
-          <a:lstStyle/>
-          <a:p>
-            <a:endParaRPr lang="en-CA" dirty="0"/>
-          </a:p>
-        </p:txBody>
-      </p:sp>
       <p:pic>
         <p:nvPicPr>
           <p:cNvPr id="3" name="Picture 2">
@@ -23332,6 +24407,162 @@
           </a:prstGeom>
         </p:spPr>
       </p:pic>
+      <p:sp>
+        <p:nvSpPr>
+          <p:cNvPr id="5" name="Arrow: Right 4">
+            <a:extLst>
+              <a:ext uri="{FF2B5EF4-FFF2-40B4-BE49-F238E27FC236}">
+                <a16:creationId xmlns:a16="http://schemas.microsoft.com/office/drawing/2014/main" id="{7F724E54-C5A7-4F6F-85A1-A391ACAD7EF2}"/>
+              </a:ext>
+            </a:extLst>
+          </p:cNvPr>
+          <p:cNvSpPr/>
+          <p:nvPr/>
+        </p:nvSpPr>
+        <p:spPr>
+          <a:xfrm>
+            <a:off x="577668" y="5650030"/>
+            <a:ext cx="10248899" cy="1150219"/>
+          </a:xfrm>
+          <a:prstGeom prst="rightArrow">
+            <a:avLst/>
+          </a:prstGeom>
+          <a:solidFill>
+            <a:schemeClr val="accent1">
+              <a:alpha val="42000"/>
+            </a:schemeClr>
+          </a:solidFill>
+        </p:spPr>
+        <p:style>
+          <a:lnRef idx="2">
+            <a:schemeClr val="accent1">
+              <a:shade val="50000"/>
+            </a:schemeClr>
+          </a:lnRef>
+          <a:fillRef idx="1">
+            <a:schemeClr val="accent1"/>
+          </a:fillRef>
+          <a:effectRef idx="0">
+            <a:schemeClr val="accent1"/>
+          </a:effectRef>
+          <a:fontRef idx="minor">
+            <a:schemeClr val="lt1"/>
+          </a:fontRef>
+        </p:style>
+        <p:txBody>
+          <a:bodyPr rtlCol="0" anchor="ctr"/>
+          <a:lstStyle/>
+          <a:p>
+            <a:pPr algn="ctr"/>
+            <a:endParaRPr lang="en-CA" dirty="0"/>
+          </a:p>
+        </p:txBody>
+      </p:sp>
+      <p:sp>
+        <p:nvSpPr>
+          <p:cNvPr id="6" name="TextBox 5">
+            <a:extLst>
+              <a:ext uri="{FF2B5EF4-FFF2-40B4-BE49-F238E27FC236}">
+                <a16:creationId xmlns:a16="http://schemas.microsoft.com/office/drawing/2014/main" id="{7B2E65EE-D373-45E7-ACF6-BEB0E830B038}"/>
+              </a:ext>
+            </a:extLst>
+          </p:cNvPr>
+          <p:cNvSpPr txBox="1"/>
+          <p:nvPr/>
+        </p:nvSpPr>
+        <p:spPr>
+          <a:xfrm>
+            <a:off x="725715" y="6040473"/>
+            <a:ext cx="1681358" cy="369332"/>
+          </a:xfrm>
+          <a:prstGeom prst="rect">
+            <a:avLst/>
+          </a:prstGeom>
+          <a:noFill/>
+        </p:spPr>
+        <p:txBody>
+          <a:bodyPr wrap="none" rtlCol="0">
+            <a:spAutoFit/>
+          </a:bodyPr>
+          <a:lstStyle/>
+          <a:p>
+            <a:r>
+              <a:rPr lang="en-CA" dirty="0"/>
+              <a:t>Refractive index</a:t>
+            </a:r>
+          </a:p>
+        </p:txBody>
+      </p:sp>
+      <p:sp>
+        <p:nvSpPr>
+          <p:cNvPr id="8" name="TextBox 7">
+            <a:extLst>
+              <a:ext uri="{FF2B5EF4-FFF2-40B4-BE49-F238E27FC236}">
+                <a16:creationId xmlns:a16="http://schemas.microsoft.com/office/drawing/2014/main" id="{D037A181-5CAF-46C1-B028-7D421E0D2BF9}"/>
+              </a:ext>
+            </a:extLst>
+          </p:cNvPr>
+          <p:cNvSpPr txBox="1"/>
+          <p:nvPr/>
+        </p:nvSpPr>
+        <p:spPr>
+          <a:xfrm>
+            <a:off x="2833722" y="6040473"/>
+            <a:ext cx="1301831" cy="369332"/>
+          </a:xfrm>
+          <a:prstGeom prst="rect">
+            <a:avLst/>
+          </a:prstGeom>
+          <a:noFill/>
+        </p:spPr>
+        <p:txBody>
+          <a:bodyPr wrap="none" rtlCol="0">
+            <a:spAutoFit/>
+          </a:bodyPr>
+          <a:lstStyle/>
+          <a:p>
+            <a:r>
+              <a:rPr lang="en-CA" dirty="0"/>
+              <a:t>Transparent</a:t>
+            </a:r>
+          </a:p>
+        </p:txBody>
+      </p:sp>
+      <p:sp>
+        <p:nvSpPr>
+          <p:cNvPr id="9" name="TextBox 8">
+            <a:extLst>
+              <a:ext uri="{FF2B5EF4-FFF2-40B4-BE49-F238E27FC236}">
+                <a16:creationId xmlns:a16="http://schemas.microsoft.com/office/drawing/2014/main" id="{6DB8E1DC-06F3-4FE1-B3F2-1C3A9C9948E4}"/>
+              </a:ext>
+            </a:extLst>
+          </p:cNvPr>
+          <p:cNvSpPr txBox="1"/>
+          <p:nvPr/>
+        </p:nvSpPr>
+        <p:spPr>
+          <a:xfrm>
+            <a:off x="621742" y="5609487"/>
+            <a:ext cx="1667508" cy="369332"/>
+          </a:xfrm>
+          <a:prstGeom prst="rect">
+            <a:avLst/>
+          </a:prstGeom>
+          <a:noFill/>
+        </p:spPr>
+        <p:txBody>
+          <a:bodyPr wrap="none" rtlCol="0">
+            <a:spAutoFit/>
+          </a:bodyPr>
+          <a:lstStyle/>
+          <a:p>
+            <a:r>
+              <a:rPr lang="en-CA" dirty="0"/>
+              <a:t>Words to know:</a:t>
+            </a:r>
+          </a:p>
+        </p:txBody>
+      </p:sp>
     </p:spTree>
     <p:extLst>
       <p:ext uri="{BB962C8B-B14F-4D97-AF65-F5344CB8AC3E}">
@@ -23502,6 +24733,162 @@
           </a:xfrm>
         </p:spPr>
       </p:pic>
+      <p:sp>
+        <p:nvSpPr>
+          <p:cNvPr id="7" name="Arrow: Right 6">
+            <a:extLst>
+              <a:ext uri="{FF2B5EF4-FFF2-40B4-BE49-F238E27FC236}">
+                <a16:creationId xmlns:a16="http://schemas.microsoft.com/office/drawing/2014/main" id="{6A735B23-40F5-4B31-AE01-44E5DBC2E66B}"/>
+              </a:ext>
+            </a:extLst>
+          </p:cNvPr>
+          <p:cNvSpPr/>
+          <p:nvPr/>
+        </p:nvSpPr>
+        <p:spPr>
+          <a:xfrm>
+            <a:off x="577668" y="5747306"/>
+            <a:ext cx="10248899" cy="1150219"/>
+          </a:xfrm>
+          <a:prstGeom prst="rightArrow">
+            <a:avLst/>
+          </a:prstGeom>
+          <a:solidFill>
+            <a:schemeClr val="accent1">
+              <a:alpha val="42000"/>
+            </a:schemeClr>
+          </a:solidFill>
+        </p:spPr>
+        <p:style>
+          <a:lnRef idx="2">
+            <a:schemeClr val="accent1">
+              <a:shade val="50000"/>
+            </a:schemeClr>
+          </a:lnRef>
+          <a:fillRef idx="1">
+            <a:schemeClr val="accent1"/>
+          </a:fillRef>
+          <a:effectRef idx="0">
+            <a:schemeClr val="accent1"/>
+          </a:effectRef>
+          <a:fontRef idx="minor">
+            <a:schemeClr val="lt1"/>
+          </a:fontRef>
+        </p:style>
+        <p:txBody>
+          <a:bodyPr rtlCol="0" anchor="ctr"/>
+          <a:lstStyle/>
+          <a:p>
+            <a:pPr algn="ctr"/>
+            <a:endParaRPr lang="en-CA" dirty="0"/>
+          </a:p>
+        </p:txBody>
+      </p:sp>
+      <p:sp>
+        <p:nvSpPr>
+          <p:cNvPr id="9" name="TextBox 8">
+            <a:extLst>
+              <a:ext uri="{FF2B5EF4-FFF2-40B4-BE49-F238E27FC236}">
+                <a16:creationId xmlns:a16="http://schemas.microsoft.com/office/drawing/2014/main" id="{14509E58-962B-47CE-9A6F-65F7CD788F2B}"/>
+              </a:ext>
+            </a:extLst>
+          </p:cNvPr>
+          <p:cNvSpPr txBox="1"/>
+          <p:nvPr/>
+        </p:nvSpPr>
+        <p:spPr>
+          <a:xfrm>
+            <a:off x="725715" y="6137749"/>
+            <a:ext cx="990977" cy="369332"/>
+          </a:xfrm>
+          <a:prstGeom prst="rect">
+            <a:avLst/>
+          </a:prstGeom>
+          <a:noFill/>
+        </p:spPr>
+        <p:txBody>
+          <a:bodyPr wrap="none" rtlCol="0">
+            <a:spAutoFit/>
+          </a:bodyPr>
+          <a:lstStyle/>
+          <a:p>
+            <a:r>
+              <a:rPr lang="en-CA" dirty="0"/>
+              <a:t>Specular</a:t>
+            </a:r>
+          </a:p>
+        </p:txBody>
+      </p:sp>
+      <p:sp>
+        <p:nvSpPr>
+          <p:cNvPr id="11" name="TextBox 10">
+            <a:extLst>
+              <a:ext uri="{FF2B5EF4-FFF2-40B4-BE49-F238E27FC236}">
+                <a16:creationId xmlns:a16="http://schemas.microsoft.com/office/drawing/2014/main" id="{8D6CDD65-1A6A-463B-9C87-DC27B597B5D0}"/>
+              </a:ext>
+            </a:extLst>
+          </p:cNvPr>
+          <p:cNvSpPr txBox="1"/>
+          <p:nvPr/>
+        </p:nvSpPr>
+        <p:spPr>
+          <a:xfrm>
+            <a:off x="1866217" y="6137749"/>
+            <a:ext cx="846065" cy="369332"/>
+          </a:xfrm>
+          <a:prstGeom prst="rect">
+            <a:avLst/>
+          </a:prstGeom>
+          <a:noFill/>
+        </p:spPr>
+        <p:txBody>
+          <a:bodyPr wrap="none" rtlCol="0">
+            <a:spAutoFit/>
+          </a:bodyPr>
+          <a:lstStyle/>
+          <a:p>
+            <a:r>
+              <a:rPr lang="en-CA" dirty="0"/>
+              <a:t>Diffuse</a:t>
+            </a:r>
+          </a:p>
+        </p:txBody>
+      </p:sp>
+      <p:sp>
+        <p:nvSpPr>
+          <p:cNvPr id="12" name="TextBox 11">
+            <a:extLst>
+              <a:ext uri="{FF2B5EF4-FFF2-40B4-BE49-F238E27FC236}">
+                <a16:creationId xmlns:a16="http://schemas.microsoft.com/office/drawing/2014/main" id="{59836317-352C-48D9-8F53-9D9F19C52D40}"/>
+              </a:ext>
+            </a:extLst>
+          </p:cNvPr>
+          <p:cNvSpPr txBox="1"/>
+          <p:nvPr/>
+        </p:nvSpPr>
+        <p:spPr>
+          <a:xfrm>
+            <a:off x="621742" y="5706763"/>
+            <a:ext cx="1667508" cy="369332"/>
+          </a:xfrm>
+          <a:prstGeom prst="rect">
+            <a:avLst/>
+          </a:prstGeom>
+          <a:noFill/>
+        </p:spPr>
+        <p:txBody>
+          <a:bodyPr wrap="none" rtlCol="0">
+            <a:spAutoFit/>
+          </a:bodyPr>
+          <a:lstStyle/>
+          <a:p>
+            <a:r>
+              <a:rPr lang="en-CA" dirty="0"/>
+              <a:t>Words to know:</a:t>
+            </a:r>
+          </a:p>
+        </p:txBody>
+      </p:sp>
     </p:spTree>
     <p:extLst>
       <p:ext uri="{BB962C8B-B14F-4D97-AF65-F5344CB8AC3E}">
@@ -23578,6 +24965,19 @@
               <a:rPr lang="en-CA" dirty="0"/>
               <a:t>how shiny/glossy it is</a:t>
             </a:r>
+          </a:p>
+          <a:p>
+            <a:pPr lvl="1"/>
+            <a:r>
+              <a:rPr lang="en-CA" dirty="0"/>
+              <a:t>Number of objects</a:t>
+            </a:r>
+          </a:p>
+          <a:p>
+            <a:pPr marL="457200" lvl="1" indent="0">
+              <a:buNone/>
+            </a:pPr>
+            <a:endParaRPr lang="en-CA" dirty="0"/>
           </a:p>
           <a:p>
             <a:r>
@@ -24532,23 +25932,6 @@
 </file>
 
 <file path=customXml/item1.xml><?xml version="1.0" encoding="utf-8"?>
-<?mso-contentType ?>
-<FormTemplates xmlns="http://schemas.microsoft.com/sharepoint/v3/contenttype/forms">
-  <Display>DocumentLibraryForm</Display>
-  <Edit>DocumentLibraryForm</Edit>
-  <New>DocumentLibraryForm</New>
-</FormTemplates>
-</file>
-
-<file path=customXml/item2.xml><?xml version="1.0" encoding="utf-8"?>
-<p:properties xmlns:p="http://schemas.microsoft.com/office/2006/metadata/properties" xmlns:xsi="http://www.w3.org/2001/XMLSchema-instance" xmlns:pc="http://schemas.microsoft.com/office/infopath/2007/PartnerControls">
-  <documentManagement>
-    <MediaServiceKeyPoints xmlns="71af3243-3dd4-4a8d-8c0d-dd76da1f02a5" xsi:nil="true"/>
-  </documentManagement>
-</p:properties>
-</file>
-
-<file path=customXml/item3.xml><?xml version="1.0" encoding="utf-8"?>
 <ct:contentTypeSchema xmlns:ct="http://schemas.microsoft.com/office/2006/metadata/contentType" xmlns:ma="http://schemas.microsoft.com/office/2006/metadata/properties/metaAttributes" ct:_="" ma:_="" ma:contentTypeName="Document" ma:contentTypeID="0x01010079F111ED35F8CC479449609E8A0923A6" ma:contentTypeVersion="11" ma:contentTypeDescription="Create a new document." ma:contentTypeScope="" ma:versionID="96291512c1ee715ab617f4c07df79fc1">
   <xsd:schema xmlns:xsd="http://www.w3.org/2001/XMLSchema" xmlns:xs="http://www.w3.org/2001/XMLSchema" xmlns:p="http://schemas.microsoft.com/office/2006/metadata/properties" xmlns:ns2="71af3243-3dd4-4a8d-8c0d-dd76da1f02a5" xmlns:ns3="16c05727-aa75-4e4a-9b5f-8a80a1165891" targetNamespace="http://schemas.microsoft.com/office/2006/metadata/properties" ma:root="true" ma:fieldsID="8256c27c40ca5c40ce1cf6c44f0205df" ns2:_="" ns3:_="">
     <xsd:import namespace="71af3243-3dd4-4a8d-8c0d-dd76da1f02a5"/>
@@ -24759,25 +26142,24 @@
 </ct:contentTypeSchema>
 </file>
 
-<file path=customXml/itemProps1.xml><?xml version="1.0" encoding="utf-8"?>
-<ds:datastoreItem xmlns:ds="http://schemas.openxmlformats.org/officeDocument/2006/customXml" ds:itemID="{6D0B596E-8E5F-4DB7-9C0B-A416410C0FAB}">
-  <ds:schemaRefs>
-    <ds:schemaRef ds:uri="http://schemas.microsoft.com/sharepoint/v3/contenttype/forms"/>
-  </ds:schemaRefs>
-</ds:datastoreItem>
+<file path=customXml/item2.xml><?xml version="1.0" encoding="utf-8"?>
+<p:properties xmlns:p="http://schemas.microsoft.com/office/2006/metadata/properties" xmlns:xsi="http://www.w3.org/2001/XMLSchema-instance" xmlns:pc="http://schemas.microsoft.com/office/infopath/2007/PartnerControls">
+  <documentManagement>
+    <MediaServiceKeyPoints xmlns="71af3243-3dd4-4a8d-8c0d-dd76da1f02a5" xsi:nil="true"/>
+  </documentManagement>
+</p:properties>
 </file>
 
-<file path=customXml/itemProps2.xml><?xml version="1.0" encoding="utf-8"?>
-<ds:datastoreItem xmlns:ds="http://schemas.openxmlformats.org/officeDocument/2006/customXml" ds:itemID="{271DA07E-9A1F-402C-A357-ABD24F8C703B}">
-  <ds:schemaRefs>
-    <ds:schemaRef ds:uri="http://schemas.microsoft.com/office/2006/metadata/properties"/>
-    <ds:schemaRef ds:uri="http://schemas.microsoft.com/office/infopath/2007/PartnerControls"/>
-    <ds:schemaRef ds:uri="71af3243-3dd4-4a8d-8c0d-dd76da1f02a5"/>
-  </ds:schemaRefs>
-</ds:datastoreItem>
+<file path=customXml/item3.xml><?xml version="1.0" encoding="utf-8"?>
+<?mso-contentType ?>
+<FormTemplates xmlns="http://schemas.microsoft.com/sharepoint/v3/contenttype/forms">
+  <Display>DocumentLibraryForm</Display>
+  <Edit>DocumentLibraryForm</Edit>
+  <New>DocumentLibraryForm</New>
+</FormTemplates>
 </file>
 
-<file path=customXml/itemProps3.xml><?xml version="1.0" encoding="utf-8"?>
+<file path=customXml/itemProps1.xml><?xml version="1.0" encoding="utf-8"?>
 <ds:datastoreItem xmlns:ds="http://schemas.openxmlformats.org/officeDocument/2006/customXml" ds:itemID="{5215998C-280A-471A-8BB1-CDC2B95FC290}">
   <ds:schemaRefs>
     <ds:schemaRef ds:uri="http://schemas.microsoft.com/office/2006/metadata/contentType"/>
@@ -24794,4 +26176,22 @@
     <ds:schemaRef ds:uri="http://schemas.microsoft.com/internal/obd"/>
   </ds:schemaRefs>
 </ds:datastoreItem>
+</file>
+
+<file path=customXml/itemProps2.xml><?xml version="1.0" encoding="utf-8"?>
+<ds:datastoreItem xmlns:ds="http://schemas.openxmlformats.org/officeDocument/2006/customXml" ds:itemID="{271DA07E-9A1F-402C-A357-ABD24F8C703B}">
+  <ds:schemaRefs>
+    <ds:schemaRef ds:uri="http://schemas.microsoft.com/office/2006/metadata/properties"/>
+    <ds:schemaRef ds:uri="http://schemas.microsoft.com/office/infopath/2007/PartnerControls"/>
+    <ds:schemaRef ds:uri="71af3243-3dd4-4a8d-8c0d-dd76da1f02a5"/>
+  </ds:schemaRefs>
+</ds:datastoreItem>
+</file>
+
+<file path=customXml/itemProps3.xml><?xml version="1.0" encoding="utf-8"?>
+<ds:datastoreItem xmlns:ds="http://schemas.openxmlformats.org/officeDocument/2006/customXml" ds:itemID="{6D0B596E-8E5F-4DB7-9C0B-A416410C0FAB}">
+  <ds:schemaRefs>
+    <ds:schemaRef ds:uri="http://schemas.microsoft.com/sharepoint/v3/contenttype/forms"/>
+  </ds:schemaRefs>
+</ds:datastoreItem>
 </file>
</xml_diff>